<commit_message>
Update slides and code for Azure Policies
</commit_message>
<xml_diff>
--- a/09-September/policies/presentation.pptx
+++ b/09-September/policies/presentation.pptx
@@ -19,14 +19,14 @@
     <p:sldId id="469" r:id="rId10"/>
     <p:sldId id="470" r:id="rId11"/>
     <p:sldId id="451" r:id="rId12"/>
-    <p:sldId id="452" r:id="rId13"/>
+    <p:sldId id="472" r:id="rId13"/>
     <p:sldId id="454" r:id="rId14"/>
-    <p:sldId id="455" r:id="rId15"/>
+    <p:sldId id="473" r:id="rId15"/>
     <p:sldId id="457" r:id="rId16"/>
-    <p:sldId id="460" r:id="rId17"/>
+    <p:sldId id="474" r:id="rId17"/>
     <p:sldId id="461" r:id="rId18"/>
-    <p:sldId id="471" r:id="rId19"/>
-    <p:sldId id="462" r:id="rId20"/>
+    <p:sldId id="462" r:id="rId19"/>
+    <p:sldId id="471" r:id="rId20"/>
     <p:sldId id="463" r:id="rId21"/>
     <p:sldId id="464" r:id="rId22"/>
     <p:sldId id="465" r:id="rId23"/>
@@ -234,7 +234,7 @@
           <a:p>
             <a:fld id="{D91A47B6-9AD6-4A27-A864-EE37FDC585CB}" type="datetimeFigureOut">
               <a:rPr lang="en-US" smtClean="0"/>
-              <a:t>9/25/2017</a:t>
+              <a:t>10/6/2017</a:t>
             </a:fld>
             <a:endParaRPr lang="en-US"/>
           </a:p>
@@ -650,7 +650,7 @@
           <a:p>
             <a:fld id="{FCFCFBDD-1241-44C4-80AF-9CDAFA06809B}" type="slidenum">
               <a:rPr lang="en-US" smtClean="0"/>
-              <a:t>21</a:t>
+              <a:t>20</a:t>
             </a:fld>
             <a:endParaRPr lang="en-US"/>
           </a:p>
@@ -659,7 +659,7 @@
     </p:spTree>
     <p:extLst>
       <p:ext uri="{BB962C8B-B14F-4D97-AF65-F5344CB8AC3E}">
-        <p14:creationId xmlns:p14="http://schemas.microsoft.com/office/powerpoint/2010/main" val="2855505719"/>
+        <p14:creationId xmlns:p14="http://schemas.microsoft.com/office/powerpoint/2010/main" val="1152391876"/>
       </p:ext>
     </p:extLst>
   </p:cSld>
@@ -713,10 +713,6 @@
           <a:bodyPr/>
           <a:lstStyle/>
           <a:p>
-            <a:pPr marL="171450" indent="-171450">
-              <a:buFont typeface="Arial" panose="020B0604020202020204" pitchFamily="34" charset="0"/>
-              <a:buChar char="•"/>
-            </a:pPr>
             <a:endParaRPr lang="en-US" dirty="0"/>
           </a:p>
         </p:txBody>
@@ -738,7 +734,7 @@
           <a:p>
             <a:fld id="{FCFCFBDD-1241-44C4-80AF-9CDAFA06809B}" type="slidenum">
               <a:rPr lang="en-US" smtClean="0"/>
-              <a:t>22</a:t>
+              <a:t>21</a:t>
             </a:fld>
             <a:endParaRPr lang="en-US"/>
           </a:p>
@@ -747,7 +743,7 @@
     </p:spTree>
     <p:extLst>
       <p:ext uri="{BB962C8B-B14F-4D97-AF65-F5344CB8AC3E}">
-        <p14:creationId xmlns:p14="http://schemas.microsoft.com/office/powerpoint/2010/main" val="3836396715"/>
+        <p14:creationId xmlns:p14="http://schemas.microsoft.com/office/powerpoint/2010/main" val="2855505719"/>
       </p:ext>
     </p:extLst>
   </p:cSld>
@@ -801,6 +797,10 @@
           <a:bodyPr/>
           <a:lstStyle/>
           <a:p>
+            <a:pPr marL="171450" indent="-171450">
+              <a:buFont typeface="Arial" panose="020B0604020202020204" pitchFamily="34" charset="0"/>
+              <a:buChar char="•"/>
+            </a:pPr>
             <a:endParaRPr lang="en-US" dirty="0"/>
           </a:p>
         </p:txBody>
@@ -822,7 +822,7 @@
           <a:p>
             <a:fld id="{FCFCFBDD-1241-44C4-80AF-9CDAFA06809B}" type="slidenum">
               <a:rPr lang="en-US" smtClean="0"/>
-              <a:t>23</a:t>
+              <a:t>22</a:t>
             </a:fld>
             <a:endParaRPr lang="en-US"/>
           </a:p>
@@ -831,7 +831,7 @@
     </p:spTree>
     <p:extLst>
       <p:ext uri="{BB962C8B-B14F-4D97-AF65-F5344CB8AC3E}">
-        <p14:creationId xmlns:p14="http://schemas.microsoft.com/office/powerpoint/2010/main" val="3518748645"/>
+        <p14:creationId xmlns:p14="http://schemas.microsoft.com/office/powerpoint/2010/main" val="3836396715"/>
       </p:ext>
     </p:extLst>
   </p:cSld>
@@ -906,6 +906,90 @@
           <a:p>
             <a:fld id="{FCFCFBDD-1241-44C4-80AF-9CDAFA06809B}" type="slidenum">
               <a:rPr lang="en-US" smtClean="0"/>
+              <a:t>23</a:t>
+            </a:fld>
+            <a:endParaRPr lang="en-US"/>
+          </a:p>
+        </p:txBody>
+      </p:sp>
+    </p:spTree>
+    <p:extLst>
+      <p:ext uri="{BB962C8B-B14F-4D97-AF65-F5344CB8AC3E}">
+        <p14:creationId xmlns:p14="http://schemas.microsoft.com/office/powerpoint/2010/main" val="3518748645"/>
+      </p:ext>
+    </p:extLst>
+  </p:cSld>
+  <p:clrMapOvr>
+    <a:masterClrMapping/>
+  </p:clrMapOvr>
+</p:notes>
+</file>
+
+<file path=ppt/notesSlides/notesSlide14.xml><?xml version="1.0" encoding="utf-8"?>
+<p:notes xmlns:a="http://schemas.openxmlformats.org/drawingml/2006/main" xmlns:r="http://schemas.openxmlformats.org/officeDocument/2006/relationships" xmlns:p="http://schemas.openxmlformats.org/presentationml/2006/main">
+  <p:cSld>
+    <p:spTree>
+      <p:nvGrpSpPr>
+        <p:cNvPr id="1" name=""/>
+        <p:cNvGrpSpPr/>
+        <p:nvPr/>
+      </p:nvGrpSpPr>
+      <p:grpSpPr>
+        <a:xfrm>
+          <a:off x="0" y="0"/>
+          <a:ext cx="0" cy="0"/>
+          <a:chOff x="0" y="0"/>
+          <a:chExt cx="0" cy="0"/>
+        </a:xfrm>
+      </p:grpSpPr>
+      <p:sp>
+        <p:nvSpPr>
+          <p:cNvPr id="2" name="Slide Image Placeholder 1"/>
+          <p:cNvSpPr>
+            <a:spLocks noGrp="1" noRot="1" noChangeAspect="1"/>
+          </p:cNvSpPr>
+          <p:nvPr>
+            <p:ph type="sldImg"/>
+          </p:nvPr>
+        </p:nvSpPr>
+        <p:spPr/>
+      </p:sp>
+      <p:sp>
+        <p:nvSpPr>
+          <p:cNvPr id="3" name="Notes Placeholder 2"/>
+          <p:cNvSpPr>
+            <a:spLocks noGrp="1"/>
+          </p:cNvSpPr>
+          <p:nvPr>
+            <p:ph type="body" idx="1"/>
+          </p:nvPr>
+        </p:nvSpPr>
+        <p:spPr/>
+        <p:txBody>
+          <a:bodyPr/>
+          <a:lstStyle/>
+          <a:p>
+            <a:endParaRPr lang="en-US" dirty="0"/>
+          </a:p>
+        </p:txBody>
+      </p:sp>
+      <p:sp>
+        <p:nvSpPr>
+          <p:cNvPr id="4" name="Slide Number Placeholder 3"/>
+          <p:cNvSpPr>
+            <a:spLocks noGrp="1"/>
+          </p:cNvSpPr>
+          <p:nvPr>
+            <p:ph type="sldNum" sz="quarter" idx="10"/>
+          </p:nvPr>
+        </p:nvSpPr>
+        <p:spPr/>
+        <p:txBody>
+          <a:bodyPr/>
+          <a:lstStyle/>
+          <a:p>
+            <a:fld id="{FCFCFBDD-1241-44C4-80AF-9CDAFA06809B}" type="slidenum">
+              <a:rPr lang="en-US" smtClean="0"/>
               <a:t>26</a:t>
             </a:fld>
             <a:endParaRPr lang="en-US"/>
@@ -925,7 +1009,7 @@
 </p:notes>
 </file>
 
-<file path=ppt/notesSlides/notesSlide14.xml><?xml version="1.0" encoding="utf-8"?>
+<file path=ppt/notesSlides/notesSlide15.xml><?xml version="1.0" encoding="utf-8"?>
 <p:notes xmlns:a="http://schemas.openxmlformats.org/drawingml/2006/main" xmlns:r="http://schemas.openxmlformats.org/officeDocument/2006/relationships" xmlns:p="http://schemas.openxmlformats.org/presentationml/2006/main">
   <p:cSld>
     <p:spTree>
@@ -1410,7 +1494,7 @@
           <a:p>
             <a:fld id="{FCFCFBDD-1241-44C4-80AF-9CDAFA06809B}" type="slidenum">
               <a:rPr lang="en-US" smtClean="0"/>
-              <a:t>13</a:t>
+              <a:t>12</a:t>
             </a:fld>
             <a:endParaRPr lang="en-US"/>
           </a:p>
@@ -1419,7 +1503,7 @@
     </p:spTree>
     <p:extLst>
       <p:ext uri="{BB962C8B-B14F-4D97-AF65-F5344CB8AC3E}">
-        <p14:creationId xmlns:p14="http://schemas.microsoft.com/office/powerpoint/2010/main" val="2421975004"/>
+        <p14:creationId xmlns:p14="http://schemas.microsoft.com/office/powerpoint/2010/main" val="1005360309"/>
       </p:ext>
     </p:extLst>
   </p:cSld>
@@ -1494,7 +1578,7 @@
           <a:p>
             <a:fld id="{FCFCFBDD-1241-44C4-80AF-9CDAFA06809B}" type="slidenum">
               <a:rPr lang="en-US" smtClean="0"/>
-              <a:t>14</a:t>
+              <a:t>13</a:t>
             </a:fld>
             <a:endParaRPr lang="en-US"/>
           </a:p>
@@ -1503,7 +1587,7 @@
     </p:spTree>
     <p:extLst>
       <p:ext uri="{BB962C8B-B14F-4D97-AF65-F5344CB8AC3E}">
-        <p14:creationId xmlns:p14="http://schemas.microsoft.com/office/powerpoint/2010/main" val="4290580157"/>
+        <p14:creationId xmlns:p14="http://schemas.microsoft.com/office/powerpoint/2010/main" val="2421975004"/>
       </p:ext>
     </p:extLst>
   </p:cSld>
@@ -1578,7 +1662,7 @@
           <a:p>
             <a:fld id="{FCFCFBDD-1241-44C4-80AF-9CDAFA06809B}" type="slidenum">
               <a:rPr lang="en-US" smtClean="0"/>
-              <a:t>16</a:t>
+              <a:t>14</a:t>
             </a:fld>
             <a:endParaRPr lang="en-US"/>
           </a:p>
@@ -1587,7 +1671,7 @@
     </p:spTree>
     <p:extLst>
       <p:ext uri="{BB962C8B-B14F-4D97-AF65-F5344CB8AC3E}">
-        <p14:creationId xmlns:p14="http://schemas.microsoft.com/office/powerpoint/2010/main" val="498041815"/>
+        <p14:creationId xmlns:p14="http://schemas.microsoft.com/office/powerpoint/2010/main" val="3023477419"/>
       </p:ext>
     </p:extLst>
   </p:cSld>
@@ -1662,7 +1746,7 @@
           <a:p>
             <a:fld id="{FCFCFBDD-1241-44C4-80AF-9CDAFA06809B}" type="slidenum">
               <a:rPr lang="en-US" smtClean="0"/>
-              <a:t>20</a:t>
+              <a:t>16</a:t>
             </a:fld>
             <a:endParaRPr lang="en-US"/>
           </a:p>
@@ -1671,7 +1755,7 @@
     </p:spTree>
     <p:extLst>
       <p:ext uri="{BB962C8B-B14F-4D97-AF65-F5344CB8AC3E}">
-        <p14:creationId xmlns:p14="http://schemas.microsoft.com/office/powerpoint/2010/main" val="1152391876"/>
+        <p14:creationId xmlns:p14="http://schemas.microsoft.com/office/powerpoint/2010/main" val="776313961"/>
       </p:ext>
     </p:extLst>
   </p:cSld>
@@ -3717,7 +3801,7 @@
           <a:p>
             <a:fld id="{5623FB88-DD27-4DCC-AF42-62A91E0192A5}" type="datetimeFigureOut">
               <a:rPr lang="en-US" smtClean="0"/>
-              <a:t>9/25/2017</a:t>
+              <a:t>10/6/2017</a:t>
             </a:fld>
             <a:endParaRPr lang="en-US"/>
           </a:p>
@@ -8330,10 +8414,10 @@
       </p:grpSpPr>
       <p:sp>
         <p:nvSpPr>
-          <p:cNvPr id="4" name="Rectangle 3">
+          <p:cNvPr id="5" name="Rectangle 4">
             <a:extLst>
               <a:ext uri="{FF2B5EF4-FFF2-40B4-BE49-F238E27FC236}">
-                <a16:creationId xmlns:a16="http://schemas.microsoft.com/office/drawing/2014/main" id="{2DEA9888-861E-4359-8CE1-81DEBBD426DD}"/>
+                <a16:creationId xmlns:a16="http://schemas.microsoft.com/office/drawing/2014/main" id="{CEAD4C1B-50C5-4085-8788-F95FE6893D57}"/>
               </a:ext>
             </a:extLst>
           </p:cNvPr>
@@ -8342,8 +8426,8 @@
         </p:nvSpPr>
         <p:spPr>
           <a:xfrm>
-            <a:off x="748146" y="876127"/>
-            <a:ext cx="10820400" cy="5078313"/>
+            <a:off x="1206230" y="846309"/>
+            <a:ext cx="10564238" cy="5078313"/>
           </a:xfrm>
           <a:prstGeom prst="rect">
             <a:avLst/>
@@ -8494,7 +8578,7 @@
                 </a:solidFill>
                 <a:latin typeface="Consolas" panose="020B0609020204030204" pitchFamily="49" charset="0"/>
               </a:rPr>
-              <a:t>"Allowed VM SKUs"</a:t>
+              <a:t>"Allowed locations"</a:t>
             </a:r>
             <a:r>
               <a:rPr lang="en-US" dirty="0">
@@ -8541,7 +8625,7 @@
                 </a:solidFill>
                 <a:latin typeface="Consolas" panose="020B0609020204030204" pitchFamily="49" charset="0"/>
               </a:rPr>
-              <a:t>"Restrict VM SKUs that can be used."</a:t>
+              <a:t>"Restrict resource location to Australia"</a:t>
             </a:r>
             <a:r>
               <a:rPr lang="en-US" dirty="0">
@@ -8693,16 +8777,63 @@
                 </a:solidFill>
                 <a:latin typeface="Consolas" panose="020B0609020204030204" pitchFamily="49" charset="0"/>
               </a:rPr>
-              <a:t>"</a:t>
-            </a:r>
-            <a:r>
-              <a:rPr lang="en-US" dirty="0" err="1">
+              <a:t>"location"</a:t>
+            </a:r>
+            <a:r>
+              <a:rPr lang="en-US" dirty="0">
+                <a:solidFill>
+                  <a:srgbClr val="000000"/>
+                </a:solidFill>
+                <a:latin typeface="Consolas" panose="020B0609020204030204" pitchFamily="49" charset="0"/>
+              </a:rPr>
+              <a:t>,</a:t>
+            </a:r>
+          </a:p>
+          <a:p>
+            <a:r>
+              <a:rPr lang="en-US" dirty="0">
+                <a:solidFill>
+                  <a:srgbClr val="000000"/>
+                </a:solidFill>
+                <a:latin typeface="Consolas" panose="020B0609020204030204" pitchFamily="49" charset="0"/>
+              </a:rPr>
+              <a:t>                    </a:t>
+            </a:r>
+            <a:r>
+              <a:rPr lang="en-US" dirty="0">
+                <a:solidFill>
+                  <a:srgbClr val="2E75B6"/>
+                </a:solidFill>
+                <a:latin typeface="Consolas" panose="020B0609020204030204" pitchFamily="49" charset="0"/>
+              </a:rPr>
+              <a:t>"in"</a:t>
+            </a:r>
+            <a:r>
+              <a:rPr lang="en-US" dirty="0">
+                <a:solidFill>
+                  <a:srgbClr val="000000"/>
+                </a:solidFill>
+                <a:latin typeface="Consolas" panose="020B0609020204030204" pitchFamily="49" charset="0"/>
+              </a:rPr>
+              <a:t>: [</a:t>
+            </a:r>
+            <a:r>
+              <a:rPr lang="en-US" dirty="0">
                 <a:solidFill>
                   <a:srgbClr val="A31515"/>
                 </a:solidFill>
                 <a:latin typeface="Consolas" panose="020B0609020204030204" pitchFamily="49" charset="0"/>
               </a:rPr>
-              <a:t>Microsoft.Compute</a:t>
+              <a:t>"Australia East"</a:t>
+            </a:r>
+            <a:r>
+              <a:rPr lang="en-US" dirty="0">
+                <a:solidFill>
+                  <a:srgbClr val="000000"/>
+                </a:solidFill>
+                <a:latin typeface="Consolas" panose="020B0609020204030204" pitchFamily="49" charset="0"/>
+              </a:rPr>
+              <a:t>, </a:t>
             </a:r>
             <a:r>
               <a:rPr lang="en-US" dirty="0">
@@ -8711,90 +8842,7 @@
                 </a:solidFill>
                 <a:latin typeface="Consolas" panose="020B0609020204030204" pitchFamily="49" charset="0"/>
               </a:rPr>
-              <a:t>/</a:t>
-            </a:r>
-            <a:r>
-              <a:rPr lang="en-US" dirty="0" err="1">
-                <a:solidFill>
-                  <a:srgbClr val="A31515"/>
-                </a:solidFill>
-                <a:latin typeface="Consolas" panose="020B0609020204030204" pitchFamily="49" charset="0"/>
-              </a:rPr>
-              <a:t>virtualMachines</a:t>
-            </a:r>
-            <a:r>
-              <a:rPr lang="en-US" dirty="0">
-                <a:solidFill>
-                  <a:srgbClr val="A31515"/>
-                </a:solidFill>
-                <a:latin typeface="Consolas" panose="020B0609020204030204" pitchFamily="49" charset="0"/>
-              </a:rPr>
-              <a:t>/sku.name"</a:t>
-            </a:r>
-            <a:r>
-              <a:rPr lang="en-US" dirty="0">
-                <a:solidFill>
-                  <a:srgbClr val="000000"/>
-                </a:solidFill>
-                <a:latin typeface="Consolas" panose="020B0609020204030204" pitchFamily="49" charset="0"/>
-              </a:rPr>
-              <a:t>,</a:t>
-            </a:r>
-          </a:p>
-          <a:p>
-            <a:r>
-              <a:rPr lang="en-US" dirty="0">
-                <a:solidFill>
-                  <a:srgbClr val="000000"/>
-                </a:solidFill>
-                <a:latin typeface="Consolas" panose="020B0609020204030204" pitchFamily="49" charset="0"/>
-              </a:rPr>
-              <a:t>                    </a:t>
-            </a:r>
-            <a:r>
-              <a:rPr lang="en-US" dirty="0">
-                <a:solidFill>
-                  <a:srgbClr val="2E75B6"/>
-                </a:solidFill>
-                <a:latin typeface="Consolas" panose="020B0609020204030204" pitchFamily="49" charset="0"/>
-              </a:rPr>
-              <a:t>"in"</a:t>
-            </a:r>
-            <a:r>
-              <a:rPr lang="en-US" dirty="0">
-                <a:solidFill>
-                  <a:srgbClr val="000000"/>
-                </a:solidFill>
-                <a:latin typeface="Consolas" panose="020B0609020204030204" pitchFamily="49" charset="0"/>
-              </a:rPr>
-              <a:t>: [</a:t>
-            </a:r>
-            <a:r>
-              <a:rPr lang="en-US" dirty="0">
-                <a:solidFill>
-                  <a:srgbClr val="A31515"/>
-                </a:solidFill>
-                <a:latin typeface="Consolas" panose="020B0609020204030204" pitchFamily="49" charset="0"/>
-              </a:rPr>
-              <a:t>"Basic_A0"</a:t>
-            </a:r>
-            <a:r>
-              <a:rPr lang="en-US" dirty="0">
-                <a:solidFill>
-                  <a:srgbClr val="000000"/>
-                </a:solidFill>
-                <a:latin typeface="Consolas" panose="020B0609020204030204" pitchFamily="49" charset="0"/>
-              </a:rPr>
-              <a:t>, </a:t>
-            </a:r>
-            <a:r>
-              <a:rPr lang="en-US" dirty="0">
-                <a:solidFill>
-                  <a:srgbClr val="A31515"/>
-                </a:solidFill>
-                <a:latin typeface="Consolas" panose="020B0609020204030204" pitchFamily="49" charset="0"/>
-              </a:rPr>
-              <a:t>"Basic_A1"</a:t>
+              <a:t>"Australia Southeast"</a:t>
             </a:r>
             <a:r>
               <a:rPr lang="en-US" dirty="0">
@@ -8983,10 +9031,10 @@
       </p:grpSpPr>
       <p:sp>
         <p:nvSpPr>
-          <p:cNvPr id="4" name="Rectangle 3">
+          <p:cNvPr id="5" name="Rectangle 4">
             <a:extLst>
               <a:ext uri="{FF2B5EF4-FFF2-40B4-BE49-F238E27FC236}">
-                <a16:creationId xmlns:a16="http://schemas.microsoft.com/office/drawing/2014/main" id="{2DEA9888-861E-4359-8CE1-81DEBBD426DD}"/>
+                <a16:creationId xmlns:a16="http://schemas.microsoft.com/office/drawing/2014/main" id="{CEAD4C1B-50C5-4085-8788-F95FE6893D57}"/>
               </a:ext>
             </a:extLst>
           </p:cNvPr>
@@ -8995,8 +9043,8 @@
         </p:nvSpPr>
         <p:spPr>
           <a:xfrm>
-            <a:off x="748146" y="876127"/>
-            <a:ext cx="10820400" cy="5416868"/>
+            <a:off x="1206230" y="846309"/>
+            <a:ext cx="10564238" cy="5416868"/>
           </a:xfrm>
           <a:prstGeom prst="rect">
             <a:avLst/>
@@ -9147,7 +9195,7 @@
                 </a:solidFill>
                 <a:latin typeface="Consolas" panose="020B0609020204030204" pitchFamily="49" charset="0"/>
               </a:rPr>
-              <a:t>"Allowed VM SKUs"</a:t>
+              <a:t>"Allowed locations"</a:t>
             </a:r>
             <a:r>
               <a:rPr lang="en-US" dirty="0">
@@ -9194,7 +9242,7 @@
                 </a:solidFill>
                 <a:latin typeface="Consolas" panose="020B0609020204030204" pitchFamily="49" charset="0"/>
               </a:rPr>
-              <a:t>"Restrict VM SKUs that can be used."</a:t>
+              <a:t>"Restrict resource location to Australia"</a:t>
             </a:r>
             <a:r>
               <a:rPr lang="en-US" dirty="0">
@@ -9346,108 +9394,72 @@
                 </a:solidFill>
                 <a:latin typeface="Consolas" panose="020B0609020204030204" pitchFamily="49" charset="0"/>
               </a:rPr>
-              <a:t>"</a:t>
-            </a:r>
-            <a:r>
-              <a:rPr lang="en-US" sz="2000" b="1" dirty="0" err="1">
+              <a:t>"location"</a:t>
+            </a:r>
+            <a:r>
+              <a:rPr lang="en-US" sz="2000" b="1" dirty="0">
+                <a:solidFill>
+                  <a:srgbClr val="000000"/>
+                </a:solidFill>
+                <a:latin typeface="Consolas" panose="020B0609020204030204" pitchFamily="49" charset="0"/>
+              </a:rPr>
+              <a:t>,</a:t>
+            </a:r>
+          </a:p>
+          <a:p>
+            <a:r>
+              <a:rPr lang="en-US" sz="2000" b="1" dirty="0">
+                <a:solidFill>
+                  <a:srgbClr val="000000"/>
+                </a:solidFill>
+                <a:latin typeface="Consolas" panose="020B0609020204030204" pitchFamily="49" charset="0"/>
+              </a:rPr>
+              <a:t>                    </a:t>
+            </a:r>
+            <a:r>
+              <a:rPr lang="en-US" sz="2000" b="1" dirty="0">
+                <a:solidFill>
+                  <a:srgbClr val="2E75B6"/>
+                </a:solidFill>
+                <a:latin typeface="Consolas" panose="020B0609020204030204" pitchFamily="49" charset="0"/>
+              </a:rPr>
+              <a:t>"in"</a:t>
+            </a:r>
+            <a:r>
+              <a:rPr lang="en-US" sz="2000" b="1" dirty="0">
+                <a:solidFill>
+                  <a:srgbClr val="000000"/>
+                </a:solidFill>
+                <a:latin typeface="Consolas" panose="020B0609020204030204" pitchFamily="49" charset="0"/>
+              </a:rPr>
+              <a:t>: [</a:t>
+            </a:r>
+            <a:r>
+              <a:rPr lang="en-US" sz="2000" b="1" dirty="0">
                 <a:solidFill>
                   <a:srgbClr val="A31515"/>
                 </a:solidFill>
                 <a:latin typeface="Consolas" panose="020B0609020204030204" pitchFamily="49" charset="0"/>
               </a:rPr>
-              <a:t>Microsoft.Compute</a:t>
+              <a:t>"Australia East"</a:t>
             </a:r>
             <a:r>
               <a:rPr lang="en-US" sz="2000" b="1" dirty="0">
                 <a:solidFill>
+                  <a:srgbClr val="000000"/>
+                </a:solidFill>
+                <a:latin typeface="Consolas" panose="020B0609020204030204" pitchFamily="49" charset="0"/>
+              </a:rPr>
+              <a:t>, </a:t>
+            </a:r>
+            <a:r>
+              <a:rPr lang="en-US" sz="2000" b="1" dirty="0">
+                <a:solidFill>
                   <a:srgbClr val="A31515"/>
                 </a:solidFill>
                 <a:latin typeface="Consolas" panose="020B0609020204030204" pitchFamily="49" charset="0"/>
               </a:rPr>
-              <a:t>/</a:t>
-            </a:r>
-            <a:r>
-              <a:rPr lang="en-US" sz="2000" b="1" dirty="0" err="1">
-                <a:solidFill>
-                  <a:srgbClr val="A31515"/>
-                </a:solidFill>
-                <a:latin typeface="Consolas" panose="020B0609020204030204" pitchFamily="49" charset="0"/>
-              </a:rPr>
-              <a:t>virtualMachines</a:t>
-            </a:r>
-            <a:r>
-              <a:rPr lang="en-US" sz="2000" b="1" dirty="0">
-                <a:solidFill>
-                  <a:srgbClr val="A31515"/>
-                </a:solidFill>
-                <a:latin typeface="Consolas" panose="020B0609020204030204" pitchFamily="49" charset="0"/>
-              </a:rPr>
-              <a:t>/sku.name"</a:t>
-            </a:r>
-            <a:r>
-              <a:rPr lang="en-US" sz="2000" b="1" dirty="0">
-                <a:solidFill>
-                  <a:srgbClr val="000000"/>
-                </a:solidFill>
-                <a:latin typeface="Consolas" panose="020B0609020204030204" pitchFamily="49" charset="0"/>
-              </a:rPr>
-              <a:t>,</a:t>
-            </a:r>
-          </a:p>
-          <a:p>
-            <a:r>
-              <a:rPr lang="en-US" sz="2000" b="1" dirty="0">
-                <a:solidFill>
-                  <a:srgbClr val="000000"/>
-                </a:solidFill>
-                <a:latin typeface="Consolas" panose="020B0609020204030204" pitchFamily="49" charset="0"/>
-              </a:rPr>
-              <a:t>                    </a:t>
-            </a:r>
-            <a:r>
-              <a:rPr lang="en-US" sz="2000" b="1" dirty="0">
-                <a:solidFill>
-                  <a:srgbClr val="2E75B6"/>
-                </a:solidFill>
-                <a:latin typeface="Consolas" panose="020B0609020204030204" pitchFamily="49" charset="0"/>
-              </a:rPr>
-              <a:t>"in"</a:t>
-            </a:r>
-            <a:r>
-              <a:rPr lang="en-US" sz="2000" b="1" dirty="0">
-                <a:solidFill>
-                  <a:srgbClr val="000000"/>
-                </a:solidFill>
-                <a:latin typeface="Consolas" panose="020B0609020204030204" pitchFamily="49" charset="0"/>
-              </a:rPr>
-              <a:t>: [</a:t>
-            </a:r>
-            <a:r>
-              <a:rPr lang="en-US" sz="2000" b="1" dirty="0">
-                <a:solidFill>
-                  <a:srgbClr val="A31515"/>
-                </a:solidFill>
-                <a:latin typeface="Consolas" panose="020B0609020204030204" pitchFamily="49" charset="0"/>
-              </a:rPr>
-              <a:t>"Basic_A0"</a:t>
-            </a:r>
-            <a:r>
-              <a:rPr lang="en-US" sz="2000" b="1" dirty="0">
-                <a:solidFill>
-                  <a:srgbClr val="000000"/>
-                </a:solidFill>
-                <a:latin typeface="Consolas" panose="020B0609020204030204" pitchFamily="49" charset="0"/>
-              </a:rPr>
-              <a:t>, </a:t>
-            </a:r>
-            <a:r>
-              <a:rPr lang="en-US" sz="2000" b="1" dirty="0">
-                <a:solidFill>
-                  <a:srgbClr val="A31515"/>
-                </a:solidFill>
-                <a:latin typeface="Consolas" panose="020B0609020204030204" pitchFamily="49" charset="0"/>
-              </a:rPr>
-              <a:t>"Basic_A1"</a:t>
+              <a:t>"Australia Southeast"</a:t>
             </a:r>
             <a:r>
               <a:rPr lang="en-US" sz="2000" b="1" dirty="0">
@@ -9604,7 +9616,7 @@
     </p:spTree>
     <p:extLst>
       <p:ext uri="{BB962C8B-B14F-4D97-AF65-F5344CB8AC3E}">
-        <p14:creationId xmlns:p14="http://schemas.microsoft.com/office/powerpoint/2010/main" val="3626138133"/>
+        <p14:creationId xmlns:p14="http://schemas.microsoft.com/office/powerpoint/2010/main" val="869686934"/>
       </p:ext>
     </p:extLst>
   </p:cSld>
@@ -9636,10 +9648,10 @@
       </p:grpSpPr>
       <p:sp>
         <p:nvSpPr>
-          <p:cNvPr id="2" name="Rectangle 1">
+          <p:cNvPr id="3" name="Rectangle 2">
             <a:extLst>
               <a:ext uri="{FF2B5EF4-FFF2-40B4-BE49-F238E27FC236}">
-                <a16:creationId xmlns:a16="http://schemas.microsoft.com/office/drawing/2014/main" id="{937602FB-5714-41D3-9BC1-7D81752B3F6D}"/>
+                <a16:creationId xmlns:a16="http://schemas.microsoft.com/office/drawing/2014/main" id="{CDF3ED6B-B2DC-4EFC-8525-50596C79BA9A}"/>
               </a:ext>
             </a:extLst>
           </p:cNvPr>
@@ -9648,8 +9660,8 @@
         </p:nvSpPr>
         <p:spPr>
           <a:xfrm>
-            <a:off x="1413164" y="1346906"/>
-            <a:ext cx="9850581" cy="4401205"/>
+            <a:off x="1919592" y="1438738"/>
+            <a:ext cx="9218578" cy="3477875"/>
           </a:xfrm>
           <a:prstGeom prst="rect">
             <a:avLst/>
@@ -9764,147 +9776,81 @@
                 </a:solidFill>
                 <a:latin typeface="Consolas" panose="020B0609020204030204" pitchFamily="49" charset="0"/>
               </a:rPr>
-              <a:t>"</a:t>
-            </a:r>
-            <a:r>
-              <a:rPr lang="en-US" sz="2000" dirty="0" err="1">
+              <a:t>"location"</a:t>
+            </a:r>
+            <a:r>
+              <a:rPr lang="en-US" sz="2000" dirty="0">
+                <a:solidFill>
+                  <a:srgbClr val="000000"/>
+                </a:solidFill>
+                <a:latin typeface="Consolas" panose="020B0609020204030204" pitchFamily="49" charset="0"/>
+              </a:rPr>
+              <a:t>,</a:t>
+            </a:r>
+          </a:p>
+          <a:p>
+            <a:r>
+              <a:rPr lang="en-US" sz="2000" dirty="0">
+                <a:solidFill>
+                  <a:srgbClr val="000000"/>
+                </a:solidFill>
+                <a:latin typeface="Consolas" panose="020B0609020204030204" pitchFamily="49" charset="0"/>
+              </a:rPr>
+              <a:t>            </a:t>
+            </a:r>
+            <a:r>
+              <a:rPr lang="en-US" sz="2000" dirty="0">
+                <a:solidFill>
+                  <a:srgbClr val="2E75B6"/>
+                </a:solidFill>
+                <a:latin typeface="Consolas" panose="020B0609020204030204" pitchFamily="49" charset="0"/>
+              </a:rPr>
+              <a:t>"in"</a:t>
+            </a:r>
+            <a:r>
+              <a:rPr lang="en-US" sz="2000" dirty="0">
+                <a:solidFill>
+                  <a:srgbClr val="000000"/>
+                </a:solidFill>
+                <a:latin typeface="Consolas" panose="020B0609020204030204" pitchFamily="49" charset="0"/>
+              </a:rPr>
+              <a:t>: [</a:t>
+            </a:r>
+            <a:r>
+              <a:rPr lang="en-US" sz="2000" dirty="0">
                 <a:solidFill>
                   <a:srgbClr val="A31515"/>
                 </a:solidFill>
                 <a:latin typeface="Consolas" panose="020B0609020204030204" pitchFamily="49" charset="0"/>
               </a:rPr>
-              <a:t>Microsoft.Compute</a:t>
+              <a:t>"Australia East"</a:t>
             </a:r>
             <a:r>
               <a:rPr lang="en-US" sz="2000" dirty="0">
                 <a:solidFill>
+                  <a:srgbClr val="000000"/>
+                </a:solidFill>
+                <a:latin typeface="Consolas" panose="020B0609020204030204" pitchFamily="49" charset="0"/>
+              </a:rPr>
+              <a:t>, </a:t>
+            </a:r>
+            <a:r>
+              <a:rPr lang="en-US" sz="2000" dirty="0">
+                <a:solidFill>
                   <a:srgbClr val="A31515"/>
                 </a:solidFill>
                 <a:latin typeface="Consolas" panose="020B0609020204030204" pitchFamily="49" charset="0"/>
               </a:rPr>
-              <a:t>/</a:t>
-            </a:r>
-            <a:r>
-              <a:rPr lang="en-US" sz="2000" dirty="0" err="1">
-                <a:solidFill>
-                  <a:srgbClr val="A31515"/>
-                </a:solidFill>
-                <a:latin typeface="Consolas" panose="020B0609020204030204" pitchFamily="49" charset="0"/>
-              </a:rPr>
-              <a:t>virtualMachines</a:t>
+              <a:t>"Australia Southeast"</a:t>
             </a:r>
             <a:r>
               <a:rPr lang="en-US" sz="2000" dirty="0">
                 <a:solidFill>
-                  <a:srgbClr val="A31515"/>
-                </a:solidFill>
-                <a:latin typeface="Consolas" panose="020B0609020204030204" pitchFamily="49" charset="0"/>
-              </a:rPr>
-              <a:t>/sku.name"</a:t>
-            </a:r>
-            <a:r>
-              <a:rPr lang="en-US" sz="2000" dirty="0">
-                <a:solidFill>
-                  <a:srgbClr val="000000"/>
-                </a:solidFill>
-                <a:latin typeface="Consolas" panose="020B0609020204030204" pitchFamily="49" charset="0"/>
-              </a:rPr>
-              <a:t>,</a:t>
-            </a:r>
-          </a:p>
-          <a:p>
-            <a:r>
-              <a:rPr lang="en-US" sz="2000" dirty="0">
-                <a:solidFill>
-                  <a:srgbClr val="000000"/>
-                </a:solidFill>
-                <a:latin typeface="Consolas" panose="020B0609020204030204" pitchFamily="49" charset="0"/>
-              </a:rPr>
-              <a:t>            </a:t>
-            </a:r>
-            <a:r>
-              <a:rPr lang="en-US" sz="2000" dirty="0">
-                <a:solidFill>
-                  <a:srgbClr val="2E75B6"/>
-                </a:solidFill>
-                <a:latin typeface="Consolas" panose="020B0609020204030204" pitchFamily="49" charset="0"/>
-              </a:rPr>
-              <a:t>"in"</a:t>
-            </a:r>
-            <a:r>
-              <a:rPr lang="en-US" sz="2000" dirty="0">
-                <a:solidFill>
-                  <a:srgbClr val="000000"/>
-                </a:solidFill>
-                <a:latin typeface="Consolas" panose="020B0609020204030204" pitchFamily="49" charset="0"/>
-              </a:rPr>
-              <a:t>: [</a:t>
-            </a:r>
-          </a:p>
-          <a:p>
-            <a:r>
-              <a:rPr lang="en-US" sz="2000" dirty="0">
-                <a:solidFill>
-                  <a:srgbClr val="000000"/>
-                </a:solidFill>
-                <a:latin typeface="Consolas" panose="020B0609020204030204" pitchFamily="49" charset="0"/>
-              </a:rPr>
-              <a:t>                </a:t>
-            </a:r>
-            <a:r>
-              <a:rPr lang="en-US" sz="2000" dirty="0">
-                <a:solidFill>
-                  <a:srgbClr val="A31515"/>
-                </a:solidFill>
-                <a:latin typeface="Consolas" panose="020B0609020204030204" pitchFamily="49" charset="0"/>
-              </a:rPr>
-              <a:t>"Basic_A0"</a:t>
-            </a:r>
-            <a:r>
-              <a:rPr lang="en-US" sz="2000" dirty="0">
-                <a:solidFill>
-                  <a:srgbClr val="000000"/>
-                </a:solidFill>
-                <a:latin typeface="Consolas" panose="020B0609020204030204" pitchFamily="49" charset="0"/>
-              </a:rPr>
-              <a:t>,</a:t>
-            </a:r>
-          </a:p>
-          <a:p>
-            <a:r>
-              <a:rPr lang="en-US" sz="2000" dirty="0">
-                <a:solidFill>
-                  <a:srgbClr val="000000"/>
-                </a:solidFill>
-                <a:latin typeface="Consolas" panose="020B0609020204030204" pitchFamily="49" charset="0"/>
-              </a:rPr>
-              <a:t>                </a:t>
-            </a:r>
-            <a:r>
-              <a:rPr lang="en-US" sz="2000" dirty="0">
-                <a:solidFill>
-                  <a:srgbClr val="A31515"/>
-                </a:solidFill>
-                <a:latin typeface="Consolas" panose="020B0609020204030204" pitchFamily="49" charset="0"/>
-              </a:rPr>
-              <a:t>"Basic_A1"</a:t>
-            </a:r>
-            <a:endParaRPr lang="en-US" sz="2000" dirty="0">
-              <a:solidFill>
-                <a:srgbClr val="000000"/>
-              </a:solidFill>
-              <a:latin typeface="Consolas" panose="020B0609020204030204" pitchFamily="49" charset="0"/>
-            </a:endParaRPr>
-          </a:p>
-          <a:p>
-            <a:r>
-              <a:rPr lang="en-US" sz="2000" dirty="0">
-                <a:solidFill>
-                  <a:srgbClr val="000000"/>
-                </a:solidFill>
-                <a:latin typeface="Consolas" panose="020B0609020204030204" pitchFamily="49" charset="0"/>
-              </a:rPr>
-              <a:t>            ]</a:t>
+                  <a:srgbClr val="000000"/>
+                </a:solidFill>
+                <a:latin typeface="Consolas" panose="020B0609020204030204" pitchFamily="49" charset="0"/>
+              </a:rPr>
+              <a:t>]</a:t>
             </a:r>
           </a:p>
           <a:p>
@@ -10062,10 +10008,10 @@
       </p:grpSpPr>
       <p:sp>
         <p:nvSpPr>
-          <p:cNvPr id="2" name="Rectangle 1">
+          <p:cNvPr id="3" name="Rectangle 2">
             <a:extLst>
               <a:ext uri="{FF2B5EF4-FFF2-40B4-BE49-F238E27FC236}">
-                <a16:creationId xmlns:a16="http://schemas.microsoft.com/office/drawing/2014/main" id="{937602FB-5714-41D3-9BC1-7D81752B3F6D}"/>
+                <a16:creationId xmlns:a16="http://schemas.microsoft.com/office/drawing/2014/main" id="{CDF3ED6B-B2DC-4EFC-8525-50596C79BA9A}"/>
               </a:ext>
             </a:extLst>
           </p:cNvPr>
@@ -10074,8 +10020,8 @@
         </p:nvSpPr>
         <p:spPr>
           <a:xfrm>
-            <a:off x="1413164" y="1346906"/>
-            <a:ext cx="9850581" cy="4370427"/>
+            <a:off x="1919592" y="1438738"/>
+            <a:ext cx="9218578" cy="3477875"/>
           </a:xfrm>
           <a:prstGeom prst="rect">
             <a:avLst/>
@@ -10135,6 +10081,127 @@
             </a:endParaRPr>
           </a:p>
           <a:p>
+            <a:r>
+              <a:rPr lang="en-US" sz="2000" dirty="0">
+                <a:solidFill>
+                  <a:srgbClr val="000000"/>
+                </a:solidFill>
+                <a:latin typeface="Consolas" panose="020B0609020204030204" pitchFamily="49" charset="0"/>
+              </a:rPr>
+              <a:t>        </a:t>
+            </a:r>
+            <a:r>
+              <a:rPr lang="en-US" sz="2000" b="1" dirty="0">
+                <a:latin typeface="Consolas" panose="020B0609020204030204" pitchFamily="49" charset="0"/>
+              </a:rPr>
+              <a:t>&lt;condition&gt; | &lt;logical operator&gt;</a:t>
+            </a:r>
+          </a:p>
+          <a:p>
+            <a:endParaRPr lang="en-US" sz="2000" b="1" dirty="0">
+              <a:latin typeface="Consolas" panose="020B0609020204030204" pitchFamily="49" charset="0"/>
+            </a:endParaRPr>
+          </a:p>
+          <a:p>
+            <a:endParaRPr lang="en-US" sz="2000" b="1" dirty="0">
+              <a:latin typeface="Consolas" panose="020B0609020204030204" pitchFamily="49" charset="0"/>
+            </a:endParaRPr>
+          </a:p>
+          <a:p>
+            <a:r>
+              <a:rPr lang="en-US" sz="2000" dirty="0">
+                <a:solidFill>
+                  <a:srgbClr val="000000"/>
+                </a:solidFill>
+                <a:latin typeface="Consolas" panose="020B0609020204030204" pitchFamily="49" charset="0"/>
+              </a:rPr>
+              <a:t>    },</a:t>
+            </a:r>
+          </a:p>
+          <a:p>
+            <a:r>
+              <a:rPr lang="en-US" sz="2000" dirty="0">
+                <a:solidFill>
+                  <a:srgbClr val="000000"/>
+                </a:solidFill>
+                <a:latin typeface="Consolas" panose="020B0609020204030204" pitchFamily="49" charset="0"/>
+              </a:rPr>
+              <a:t>    </a:t>
+            </a:r>
+            <a:r>
+              <a:rPr lang="en-US" sz="2000" dirty="0">
+                <a:solidFill>
+                  <a:srgbClr val="2E75B6"/>
+                </a:solidFill>
+                <a:latin typeface="Consolas" panose="020B0609020204030204" pitchFamily="49" charset="0"/>
+              </a:rPr>
+              <a:t>"then"</a:t>
+            </a:r>
+            <a:r>
+              <a:rPr lang="en-US" sz="2000" dirty="0">
+                <a:solidFill>
+                  <a:srgbClr val="000000"/>
+                </a:solidFill>
+                <a:latin typeface="Consolas" panose="020B0609020204030204" pitchFamily="49" charset="0"/>
+              </a:rPr>
+              <a:t>: {</a:t>
+            </a:r>
+          </a:p>
+          <a:p>
+            <a:r>
+              <a:rPr lang="en-US" sz="2000" dirty="0">
+                <a:solidFill>
+                  <a:srgbClr val="000000"/>
+                </a:solidFill>
+                <a:latin typeface="Consolas" panose="020B0609020204030204" pitchFamily="49" charset="0"/>
+              </a:rPr>
+              <a:t>        </a:t>
+            </a:r>
+            <a:r>
+              <a:rPr lang="en-US" sz="2000" dirty="0">
+                <a:solidFill>
+                  <a:srgbClr val="2E75B6"/>
+                </a:solidFill>
+                <a:latin typeface="Consolas" panose="020B0609020204030204" pitchFamily="49" charset="0"/>
+              </a:rPr>
+              <a:t>"effect"</a:t>
+            </a:r>
+            <a:r>
+              <a:rPr lang="en-US" sz="2000" dirty="0">
+                <a:solidFill>
+                  <a:srgbClr val="000000"/>
+                </a:solidFill>
+                <a:latin typeface="Consolas" panose="020B0609020204030204" pitchFamily="49" charset="0"/>
+              </a:rPr>
+              <a:t>: </a:t>
+            </a:r>
+            <a:r>
+              <a:rPr lang="en-US" sz="2000" dirty="0">
+                <a:solidFill>
+                  <a:srgbClr val="A31515"/>
+                </a:solidFill>
+                <a:latin typeface="Consolas" panose="020B0609020204030204" pitchFamily="49" charset="0"/>
+              </a:rPr>
+              <a:t>"</a:t>
+            </a:r>
+            <a:r>
+              <a:rPr lang="en-US" sz="2000" b="1" dirty="0">
+                <a:solidFill>
+                  <a:srgbClr val="A31515"/>
+                </a:solidFill>
+                <a:latin typeface="Consolas" panose="020B0609020204030204" pitchFamily="49" charset="0"/>
+              </a:rPr>
+              <a:t> deny | audit | append | …</a:t>
+            </a:r>
+            <a:r>
+              <a:rPr lang="en-US" sz="2000" dirty="0">
+                <a:solidFill>
+                  <a:srgbClr val="A31515"/>
+                </a:solidFill>
+                <a:latin typeface="Consolas" panose="020B0609020204030204" pitchFamily="49" charset="0"/>
+              </a:rPr>
+              <a:t>"</a:t>
+            </a:r>
             <a:endParaRPr lang="en-US" sz="2000" dirty="0">
               <a:solidFill>
                 <a:srgbClr val="000000"/>
@@ -10150,158 +10217,6 @@
                 </a:solidFill>
                 <a:latin typeface="Consolas" panose="020B0609020204030204" pitchFamily="49" charset="0"/>
               </a:rPr>
-              <a:t>        </a:t>
-            </a:r>
-          </a:p>
-          <a:p>
-            <a:r>
-              <a:rPr lang="en-US" sz="2000" dirty="0">
-                <a:solidFill>
-                  <a:srgbClr val="000000"/>
-                </a:solidFill>
-                <a:latin typeface="Consolas" panose="020B0609020204030204" pitchFamily="49" charset="0"/>
-              </a:rPr>
-              <a:t>	</a:t>
-            </a:r>
-            <a:r>
-              <a:rPr lang="en-US" sz="2000" b="1" dirty="0">
-                <a:latin typeface="Consolas" panose="020B0609020204030204" pitchFamily="49" charset="0"/>
-              </a:rPr>
-              <a:t>&lt;condition&gt; | &lt;logical operator&gt;</a:t>
-            </a:r>
-          </a:p>
-          <a:p>
-            <a:endParaRPr lang="en-US" dirty="0"/>
-          </a:p>
-          <a:p>
-            <a:endParaRPr lang="en-US" sz="2000" dirty="0">
-              <a:solidFill>
-                <a:srgbClr val="000000"/>
-              </a:solidFill>
-              <a:latin typeface="Consolas" panose="020B0609020204030204" pitchFamily="49" charset="0"/>
-            </a:endParaRPr>
-          </a:p>
-          <a:p>
-            <a:r>
-              <a:rPr lang="en-US" sz="2000" dirty="0">
-                <a:solidFill>
-                  <a:srgbClr val="000000"/>
-                </a:solidFill>
-                <a:latin typeface="Consolas" panose="020B0609020204030204" pitchFamily="49" charset="0"/>
-              </a:rPr>
-              <a:t>    </a:t>
-            </a:r>
-          </a:p>
-          <a:p>
-            <a:r>
-              <a:rPr lang="en-US" sz="2000" dirty="0">
-                <a:solidFill>
-                  <a:srgbClr val="000000"/>
-                </a:solidFill>
-                <a:latin typeface="Consolas" panose="020B0609020204030204" pitchFamily="49" charset="0"/>
-              </a:rPr>
-              <a:t>    },</a:t>
-            </a:r>
-          </a:p>
-          <a:p>
-            <a:r>
-              <a:rPr lang="en-US" sz="2000" dirty="0">
-                <a:solidFill>
-                  <a:srgbClr val="000000"/>
-                </a:solidFill>
-                <a:latin typeface="Consolas" panose="020B0609020204030204" pitchFamily="49" charset="0"/>
-              </a:rPr>
-              <a:t>    </a:t>
-            </a:r>
-            <a:r>
-              <a:rPr lang="en-US" sz="2000" dirty="0">
-                <a:solidFill>
-                  <a:srgbClr val="2E75B6"/>
-                </a:solidFill>
-                <a:latin typeface="Consolas" panose="020B0609020204030204" pitchFamily="49" charset="0"/>
-              </a:rPr>
-              <a:t>"then"</a:t>
-            </a:r>
-            <a:r>
-              <a:rPr lang="en-US" sz="2000" dirty="0">
-                <a:solidFill>
-                  <a:srgbClr val="000000"/>
-                </a:solidFill>
-                <a:latin typeface="Consolas" panose="020B0609020204030204" pitchFamily="49" charset="0"/>
-              </a:rPr>
-              <a:t>: {</a:t>
-            </a:r>
-          </a:p>
-          <a:p>
-            <a:r>
-              <a:rPr lang="en-US" sz="2000" dirty="0">
-                <a:solidFill>
-                  <a:srgbClr val="000000"/>
-                </a:solidFill>
-                <a:latin typeface="Consolas" panose="020B0609020204030204" pitchFamily="49" charset="0"/>
-              </a:rPr>
-              <a:t>        </a:t>
-            </a:r>
-            <a:r>
-              <a:rPr lang="en-US" sz="2000" dirty="0">
-                <a:solidFill>
-                  <a:srgbClr val="2E75B6"/>
-                </a:solidFill>
-                <a:latin typeface="Consolas" panose="020B0609020204030204" pitchFamily="49" charset="0"/>
-              </a:rPr>
-              <a:t>"effect"</a:t>
-            </a:r>
-            <a:r>
-              <a:rPr lang="en-US" sz="2000" dirty="0">
-                <a:solidFill>
-                  <a:srgbClr val="000000"/>
-                </a:solidFill>
-                <a:latin typeface="Consolas" panose="020B0609020204030204" pitchFamily="49" charset="0"/>
-              </a:rPr>
-              <a:t>: </a:t>
-            </a:r>
-            <a:r>
-              <a:rPr lang="en-US" sz="2000" dirty="0">
-                <a:solidFill>
-                  <a:srgbClr val="A31515"/>
-                </a:solidFill>
-                <a:latin typeface="Consolas" panose="020B0609020204030204" pitchFamily="49" charset="0"/>
-              </a:rPr>
-              <a:t>"</a:t>
-            </a:r>
-            <a:r>
-              <a:rPr lang="en-US" sz="2000" b="1" dirty="0">
-                <a:solidFill>
-                  <a:srgbClr val="A31515"/>
-                </a:solidFill>
-                <a:latin typeface="Consolas" panose="020B0609020204030204" pitchFamily="49" charset="0"/>
-              </a:rPr>
-              <a:t>deny | audit | append</a:t>
-            </a:r>
-            <a:r>
-              <a:rPr lang="en-US" sz="2000" dirty="0">
-                <a:solidFill>
-                  <a:srgbClr val="A31515"/>
-                </a:solidFill>
-                <a:latin typeface="Consolas" panose="020B0609020204030204" pitchFamily="49" charset="0"/>
-              </a:rPr>
-              <a:t>"</a:t>
-            </a:r>
-            <a:endParaRPr lang="en-US" sz="2000" dirty="0">
-              <a:solidFill>
-                <a:srgbClr val="000000"/>
-              </a:solidFill>
-              <a:latin typeface="Consolas" panose="020B0609020204030204" pitchFamily="49" charset="0"/>
-            </a:endParaRPr>
-          </a:p>
-          <a:p>
-            <a:r>
-              <a:rPr lang="en-US" sz="2000" dirty="0">
-                <a:solidFill>
-                  <a:srgbClr val="000000"/>
-                </a:solidFill>
-                <a:latin typeface="Consolas" panose="020B0609020204030204" pitchFamily="49" charset="0"/>
-              </a:rPr>
               <a:t>    }</a:t>
             </a:r>
           </a:p>
@@ -10322,7 +10237,7 @@
     </p:spTree>
     <p:extLst>
       <p:ext uri="{BB962C8B-B14F-4D97-AF65-F5344CB8AC3E}">
-        <p14:creationId xmlns:p14="http://schemas.microsoft.com/office/powerpoint/2010/main" val="1354128207"/>
+        <p14:creationId xmlns:p14="http://schemas.microsoft.com/office/powerpoint/2010/main" val="3397986078"/>
       </p:ext>
     </p:extLst>
   </p:cSld>
@@ -10461,10 +10376,10 @@
       </p:grpSpPr>
       <p:sp>
         <p:nvSpPr>
-          <p:cNvPr id="2" name="Rectangle 1">
+          <p:cNvPr id="3" name="Rectangle 2">
             <a:extLst>
               <a:ext uri="{FF2B5EF4-FFF2-40B4-BE49-F238E27FC236}">
-                <a16:creationId xmlns:a16="http://schemas.microsoft.com/office/drawing/2014/main" id="{937602FB-5714-41D3-9BC1-7D81752B3F6D}"/>
+                <a16:creationId xmlns:a16="http://schemas.microsoft.com/office/drawing/2014/main" id="{CDF3ED6B-B2DC-4EFC-8525-50596C79BA9A}"/>
               </a:ext>
             </a:extLst>
           </p:cNvPr>
@@ -10473,8 +10388,8 @@
         </p:nvSpPr>
         <p:spPr>
           <a:xfrm>
-            <a:off x="304801" y="1319197"/>
-            <a:ext cx="11887199" cy="4832092"/>
+            <a:off x="1919591" y="1438738"/>
+            <a:ext cx="9714689" cy="3539430"/>
           </a:xfrm>
           <a:prstGeom prst="rect">
             <a:avLst/>
@@ -10554,7 +10469,7 @@
               <a:t>: </a:t>
             </a:r>
             <a:r>
-              <a:rPr lang="en-US" sz="2400" b="1" dirty="0">
+              <a:rPr lang="en-US" sz="2000" b="1" dirty="0">
                 <a:solidFill>
                   <a:srgbClr val="000000"/>
                 </a:solidFill>
@@ -10565,7 +10480,7 @@
           </a:p>
           <a:p>
             <a:r>
-              <a:rPr lang="en-US" sz="2400" b="1" dirty="0">
+              <a:rPr lang="en-US" sz="2000" dirty="0">
                 <a:solidFill>
                   <a:srgbClr val="000000"/>
                 </a:solidFill>
@@ -10574,7 +10489,7 @@
               <a:t>            </a:t>
             </a:r>
             <a:r>
-              <a:rPr lang="en-US" sz="2400" b="1" dirty="0">
+              <a:rPr lang="en-US" sz="2200" b="1" dirty="0">
                 <a:solidFill>
                   <a:srgbClr val="2E75B6"/>
                 </a:solidFill>
@@ -10583,7 +10498,7 @@
               <a:t>"field"</a:t>
             </a:r>
             <a:r>
-              <a:rPr lang="en-US" sz="2400" b="1" dirty="0">
+              <a:rPr lang="en-US" sz="2200" b="1" dirty="0">
                 <a:solidFill>
                   <a:srgbClr val="000000"/>
                 </a:solidFill>
@@ -10592,164 +10507,107 @@
               <a:t>: </a:t>
             </a:r>
             <a:r>
-              <a:rPr lang="en-US" sz="2400" b="1" dirty="0">
+              <a:rPr lang="en-US" sz="2200" b="1" dirty="0">
                 <a:solidFill>
                   <a:srgbClr val="A31515"/>
                 </a:solidFill>
                 <a:latin typeface="Consolas" panose="020B0609020204030204" pitchFamily="49" charset="0"/>
               </a:rPr>
-              <a:t>"</a:t>
-            </a:r>
-            <a:r>
-              <a:rPr lang="en-US" sz="2400" b="1" dirty="0" err="1">
+              <a:t>"location"</a:t>
+            </a:r>
+            <a:r>
+              <a:rPr lang="en-US" sz="2200" b="1" dirty="0">
+                <a:solidFill>
+                  <a:srgbClr val="000000"/>
+                </a:solidFill>
+                <a:latin typeface="Consolas" panose="020B0609020204030204" pitchFamily="49" charset="0"/>
+              </a:rPr>
+              <a:t>,</a:t>
+            </a:r>
+          </a:p>
+          <a:p>
+            <a:r>
+              <a:rPr lang="en-US" sz="2200" b="1" dirty="0">
+                <a:solidFill>
+                  <a:srgbClr val="000000"/>
+                </a:solidFill>
+                <a:latin typeface="Consolas" panose="020B0609020204030204" pitchFamily="49" charset="0"/>
+              </a:rPr>
+              <a:t>            </a:t>
+            </a:r>
+            <a:r>
+              <a:rPr lang="en-US" sz="2200" b="1" dirty="0">
+                <a:solidFill>
+                  <a:srgbClr val="2E75B6"/>
+                </a:solidFill>
+                <a:latin typeface="Consolas" panose="020B0609020204030204" pitchFamily="49" charset="0"/>
+              </a:rPr>
+              <a:t>"in"</a:t>
+            </a:r>
+            <a:r>
+              <a:rPr lang="en-US" sz="2200" b="1" dirty="0">
+                <a:solidFill>
+                  <a:srgbClr val="000000"/>
+                </a:solidFill>
+                <a:latin typeface="Consolas" panose="020B0609020204030204" pitchFamily="49" charset="0"/>
+              </a:rPr>
+              <a:t>: [</a:t>
+            </a:r>
+            <a:r>
+              <a:rPr lang="en-US" sz="2200" b="1" dirty="0">
                 <a:solidFill>
                   <a:srgbClr val="A31515"/>
                 </a:solidFill>
                 <a:latin typeface="Consolas" panose="020B0609020204030204" pitchFamily="49" charset="0"/>
               </a:rPr>
-              <a:t>Microsoft.Compute</a:t>
-            </a:r>
-            <a:r>
-              <a:rPr lang="en-US" sz="2400" b="1" dirty="0">
+              <a:t>"Australia East"</a:t>
+            </a:r>
+            <a:r>
+              <a:rPr lang="en-US" sz="2200" b="1" dirty="0">
+                <a:solidFill>
+                  <a:srgbClr val="000000"/>
+                </a:solidFill>
+                <a:latin typeface="Consolas" panose="020B0609020204030204" pitchFamily="49" charset="0"/>
+              </a:rPr>
+              <a:t>, </a:t>
+            </a:r>
+            <a:r>
+              <a:rPr lang="en-US" sz="2200" b="1" dirty="0">
                 <a:solidFill>
                   <a:srgbClr val="A31515"/>
                 </a:solidFill>
                 <a:latin typeface="Consolas" panose="020B0609020204030204" pitchFamily="49" charset="0"/>
               </a:rPr>
-              <a:t>/</a:t>
-            </a:r>
-            <a:r>
-              <a:rPr lang="en-US" sz="2400" b="1" dirty="0" err="1">
-                <a:solidFill>
-                  <a:srgbClr val="A31515"/>
-                </a:solidFill>
-                <a:latin typeface="Consolas" panose="020B0609020204030204" pitchFamily="49" charset="0"/>
-              </a:rPr>
-              <a:t>virtualMachines</a:t>
-            </a:r>
-            <a:r>
-              <a:rPr lang="en-US" sz="2400" b="1" dirty="0">
-                <a:solidFill>
-                  <a:srgbClr val="A31515"/>
-                </a:solidFill>
-                <a:latin typeface="Consolas" panose="020B0609020204030204" pitchFamily="49" charset="0"/>
-              </a:rPr>
-              <a:t>/sku.name"</a:t>
-            </a:r>
-            <a:r>
-              <a:rPr lang="en-US" sz="2400" b="1" dirty="0">
-                <a:solidFill>
-                  <a:srgbClr val="000000"/>
-                </a:solidFill>
-                <a:latin typeface="Consolas" panose="020B0609020204030204" pitchFamily="49" charset="0"/>
-              </a:rPr>
-              <a:t>,</a:t>
-            </a:r>
-          </a:p>
-          <a:p>
-            <a:r>
-              <a:rPr lang="en-US" sz="2400" b="1" dirty="0">
-                <a:solidFill>
-                  <a:srgbClr val="000000"/>
-                </a:solidFill>
-                <a:latin typeface="Consolas" panose="020B0609020204030204" pitchFamily="49" charset="0"/>
-              </a:rPr>
-              <a:t>            </a:t>
-            </a:r>
-            <a:r>
-              <a:rPr lang="en-US" sz="2400" b="1" dirty="0">
-                <a:solidFill>
-                  <a:srgbClr val="2E75B6"/>
-                </a:solidFill>
-                <a:latin typeface="Consolas" panose="020B0609020204030204" pitchFamily="49" charset="0"/>
-              </a:rPr>
-              <a:t>"in"</a:t>
-            </a:r>
-            <a:r>
-              <a:rPr lang="en-US" sz="2400" b="1" dirty="0">
-                <a:solidFill>
-                  <a:srgbClr val="000000"/>
-                </a:solidFill>
-                <a:latin typeface="Consolas" panose="020B0609020204030204" pitchFamily="49" charset="0"/>
-              </a:rPr>
-              <a:t>: [</a:t>
-            </a:r>
-          </a:p>
-          <a:p>
-            <a:r>
-              <a:rPr lang="en-US" sz="2400" b="1" dirty="0">
-                <a:solidFill>
-                  <a:srgbClr val="000000"/>
-                </a:solidFill>
-                <a:latin typeface="Consolas" panose="020B0609020204030204" pitchFamily="49" charset="0"/>
-              </a:rPr>
-              <a:t>                </a:t>
-            </a:r>
-            <a:r>
-              <a:rPr lang="en-US" sz="2400" b="1" dirty="0">
-                <a:solidFill>
-                  <a:srgbClr val="A31515"/>
-                </a:solidFill>
-                <a:latin typeface="Consolas" panose="020B0609020204030204" pitchFamily="49" charset="0"/>
-              </a:rPr>
-              <a:t>"Basic_A0"</a:t>
-            </a:r>
-            <a:r>
-              <a:rPr lang="en-US" sz="2400" b="1" dirty="0">
-                <a:solidFill>
-                  <a:srgbClr val="000000"/>
-                </a:solidFill>
-                <a:latin typeface="Consolas" panose="020B0609020204030204" pitchFamily="49" charset="0"/>
-              </a:rPr>
-              <a:t>,</a:t>
-            </a:r>
-          </a:p>
-          <a:p>
-            <a:r>
-              <a:rPr lang="en-US" sz="2400" b="1" dirty="0">
-                <a:solidFill>
-                  <a:srgbClr val="000000"/>
-                </a:solidFill>
-                <a:latin typeface="Consolas" panose="020B0609020204030204" pitchFamily="49" charset="0"/>
-              </a:rPr>
-              <a:t>                </a:t>
-            </a:r>
-            <a:r>
-              <a:rPr lang="en-US" sz="2400" b="1" dirty="0">
-                <a:solidFill>
-                  <a:srgbClr val="A31515"/>
-                </a:solidFill>
-                <a:latin typeface="Consolas" panose="020B0609020204030204" pitchFamily="49" charset="0"/>
-              </a:rPr>
-              <a:t>"Basic_A1"</a:t>
-            </a:r>
-            <a:endParaRPr lang="en-US" sz="2400" b="1" dirty="0">
-              <a:solidFill>
-                <a:srgbClr val="000000"/>
-              </a:solidFill>
-              <a:latin typeface="Consolas" panose="020B0609020204030204" pitchFamily="49" charset="0"/>
-            </a:endParaRPr>
-          </a:p>
-          <a:p>
-            <a:r>
-              <a:rPr lang="en-US" sz="2400" b="1" dirty="0">
-                <a:solidFill>
-                  <a:srgbClr val="000000"/>
-                </a:solidFill>
-                <a:latin typeface="Consolas" panose="020B0609020204030204" pitchFamily="49" charset="0"/>
-              </a:rPr>
-              <a:t>            ]</a:t>
-            </a:r>
-          </a:p>
-          <a:p>
-            <a:r>
-              <a:rPr lang="en-US" sz="2400" b="1" dirty="0">
-                <a:solidFill>
-                  <a:srgbClr val="000000"/>
-                </a:solidFill>
-                <a:latin typeface="Consolas" panose="020B0609020204030204" pitchFamily="49" charset="0"/>
-              </a:rPr>
-              <a:t>        }</a:t>
+              <a:t>"Australia Southeast"</a:t>
+            </a:r>
+            <a:r>
+              <a:rPr lang="en-US" sz="2200" b="1" dirty="0">
+                <a:solidFill>
+                  <a:srgbClr val="000000"/>
+                </a:solidFill>
+                <a:latin typeface="Consolas" panose="020B0609020204030204" pitchFamily="49" charset="0"/>
+              </a:rPr>
+              <a:t>]</a:t>
+            </a:r>
+          </a:p>
+          <a:p>
+            <a:r>
+              <a:rPr lang="en-US" sz="2000" dirty="0">
+                <a:solidFill>
+                  <a:srgbClr val="000000"/>
+                </a:solidFill>
+                <a:latin typeface="Consolas" panose="020B0609020204030204" pitchFamily="49" charset="0"/>
+              </a:rPr>
+              <a:t>        </a:t>
+            </a:r>
+            <a:r>
+              <a:rPr lang="en-US" sz="2000" b="1" dirty="0">
+                <a:solidFill>
+                  <a:srgbClr val="000000"/>
+                </a:solidFill>
+                <a:latin typeface="Consolas" panose="020B0609020204030204" pitchFamily="49" charset="0"/>
+              </a:rPr>
+              <a:t>}</a:t>
             </a:r>
           </a:p>
           <a:p>
@@ -10863,10 +10721,10 @@
       </p:sp>
       <p:sp>
         <p:nvSpPr>
-          <p:cNvPr id="3" name="Rectangle: Rounded Corners 2">
+          <p:cNvPr id="4" name="Rectangle: Rounded Corners 3">
             <a:extLst>
               <a:ext uri="{FF2B5EF4-FFF2-40B4-BE49-F238E27FC236}">
-                <a16:creationId xmlns:a16="http://schemas.microsoft.com/office/drawing/2014/main" id="{47A9A926-E4FF-4A62-987E-1B2FEDC74A05}"/>
+                <a16:creationId xmlns:a16="http://schemas.microsoft.com/office/drawing/2014/main" id="{0CEA01EF-3D95-4943-A542-A6A3FB1D94DF}"/>
               </a:ext>
             </a:extLst>
           </p:cNvPr>
@@ -10943,17 +10801,19 @@
           <p:cNvPr id="5" name="Straight Arrow Connector 4">
             <a:extLst>
               <a:ext uri="{FF2B5EF4-FFF2-40B4-BE49-F238E27FC236}">
-                <a16:creationId xmlns:a16="http://schemas.microsoft.com/office/drawing/2014/main" id="{5C1D6D5F-825A-4B72-B416-58E3DC4BFC70}"/>
+                <a16:creationId xmlns:a16="http://schemas.microsoft.com/office/drawing/2014/main" id="{CC04E3FB-9C9D-4929-9F4C-433EB77BD730}"/>
               </a:ext>
             </a:extLst>
           </p:cNvPr>
-          <p:cNvCxnSpPr/>
+          <p:cNvCxnSpPr>
+            <a:cxnSpLocks/>
+          </p:cNvCxnSpPr>
           <p:nvPr/>
         </p:nvCxnSpPr>
         <p:spPr>
           <a:xfrm flipH="1">
-            <a:off x="7287491" y="1496291"/>
-            <a:ext cx="1510145" cy="789709"/>
+            <a:off x="6809362" y="1496291"/>
+            <a:ext cx="1988275" cy="935624"/>
           </a:xfrm>
           <a:prstGeom prst="straightConnector1">
             <a:avLst/>
@@ -10986,7 +10846,7 @@
           <p:cNvPr id="6" name="Rectangle: Rounded Corners 5">
             <a:extLst>
               <a:ext uri="{FF2B5EF4-FFF2-40B4-BE49-F238E27FC236}">
-                <a16:creationId xmlns:a16="http://schemas.microsoft.com/office/drawing/2014/main" id="{A92E6C94-EB89-4225-A469-F78591783656}"/>
+                <a16:creationId xmlns:a16="http://schemas.microsoft.com/office/drawing/2014/main" id="{6BFC047B-5918-4249-9036-65BE1D52A26B}"/>
               </a:ext>
             </a:extLst>
           </p:cNvPr>
@@ -10995,7 +10855,7 @@
         </p:nvSpPr>
         <p:spPr bwMode="auto">
           <a:xfrm>
-            <a:off x="6871855" y="3796145"/>
+            <a:off x="8710383" y="3601592"/>
             <a:ext cx="1690254" cy="914400"/>
           </a:xfrm>
           <a:prstGeom prst="roundRect">
@@ -11063,7 +10923,7 @@
           <p:cNvPr id="7" name="Straight Arrow Connector 6">
             <a:extLst>
               <a:ext uri="{FF2B5EF4-FFF2-40B4-BE49-F238E27FC236}">
-                <a16:creationId xmlns:a16="http://schemas.microsoft.com/office/drawing/2014/main" id="{01E80E28-2BA4-4D0E-A90E-7ACBF7423F3B}"/>
+                <a16:creationId xmlns:a16="http://schemas.microsoft.com/office/drawing/2014/main" id="{881068E0-7257-4540-90FE-B75A2EF36D87}"/>
               </a:ext>
             </a:extLst>
           </p:cNvPr>
@@ -11074,8 +10934,8 @@
         </p:nvCxnSpPr>
         <p:spPr>
           <a:xfrm flipH="1" flipV="1">
-            <a:off x="5084618" y="3609044"/>
-            <a:ext cx="1745674" cy="616592"/>
+            <a:off x="7042826" y="3229583"/>
+            <a:ext cx="1625994" cy="801500"/>
           </a:xfrm>
           <a:prstGeom prst="straightConnector1">
             <a:avLst/>
@@ -11106,7 +10966,7 @@
     </p:spTree>
     <p:extLst>
       <p:ext uri="{BB962C8B-B14F-4D97-AF65-F5344CB8AC3E}">
-        <p14:creationId xmlns:p14="http://schemas.microsoft.com/office/powerpoint/2010/main" val="3473395921"/>
+        <p14:creationId xmlns:p14="http://schemas.microsoft.com/office/powerpoint/2010/main" val="2799964459"/>
       </p:ext>
     </p:extLst>
   </p:cSld>
@@ -11150,7 +11010,7 @@
                                           </p:stCondLst>
                                         </p:cTn>
                                         <p:tgtEl>
-                                          <p:spTgt spid="3"/>
+                                          <p:spTgt spid="4"/>
                                         </p:tgtEl>
                                         <p:attrNameLst>
                                           <p:attrName>style.visibility</p:attrName>
@@ -11290,7 +11150,7 @@
       </p:par>
     </p:tnLst>
     <p:bldLst>
-      <p:bldP spid="3" grpId="0" animBg="1"/>
+      <p:bldP spid="4" grpId="0" animBg="1"/>
       <p:bldP spid="6" grpId="0" animBg="1"/>
     </p:bldLst>
   </p:timing>
@@ -11446,909 +11306,108 @@
       </p:grpSpPr>
       <p:sp>
         <p:nvSpPr>
-          <p:cNvPr id="2" name="Rectangle 1">
+          <p:cNvPr id="2" name="Text Placeholder 1">
             <a:extLst>
               <a:ext uri="{FF2B5EF4-FFF2-40B4-BE49-F238E27FC236}">
-                <a16:creationId xmlns:a16="http://schemas.microsoft.com/office/drawing/2014/main" id="{51CF792F-9932-4AA9-B83D-67891540CBBC}"/>
+                <a16:creationId xmlns:a16="http://schemas.microsoft.com/office/drawing/2014/main" id="{FD9C373F-AB4A-4296-B0A7-0652F150A07D}"/>
               </a:ext>
             </a:extLst>
           </p:cNvPr>
-          <p:cNvSpPr/>
-          <p:nvPr/>
+          <p:cNvSpPr>
+            <a:spLocks noGrp="1"/>
+          </p:cNvSpPr>
+          <p:nvPr>
+            <p:ph type="body" sz="quarter" idx="10"/>
+          </p:nvPr>
         </p:nvSpPr>
         <p:spPr>
           <a:xfrm>
-            <a:off x="-1" y="270185"/>
-            <a:ext cx="12566073" cy="6278642"/>
+            <a:off x="269239" y="1189177"/>
+            <a:ext cx="11653523" cy="4709944"/>
           </a:xfrm>
-          <a:prstGeom prst="rect">
-            <a:avLst/>
-          </a:prstGeom>
         </p:spPr>
         <p:txBody>
-          <a:bodyPr wrap="square">
-            <a:spAutoFit/>
-          </a:bodyPr>
+          <a:bodyPr/>
           <a:lstStyle/>
           <a:p>
             <a:r>
-              <a:rPr lang="en-US" dirty="0">
-                <a:solidFill>
-                  <a:srgbClr val="000000"/>
-                </a:solidFill>
-                <a:latin typeface="Consolas" panose="020B0609020204030204" pitchFamily="49" charset="0"/>
-              </a:rPr>
-              <a:t>{</a:t>
-            </a:r>
-          </a:p>
-          <a:p>
-            <a:r>
-              <a:rPr lang="de-DE" dirty="0">
-                <a:solidFill>
-                  <a:srgbClr val="000000"/>
-                </a:solidFill>
-                <a:latin typeface="Consolas" panose="020B0609020204030204" pitchFamily="49" charset="0"/>
-              </a:rPr>
-              <a:t>    </a:t>
-            </a:r>
-            <a:r>
-              <a:rPr lang="de-DE" dirty="0">
-                <a:solidFill>
-                  <a:srgbClr val="2E75B6"/>
-                </a:solidFill>
-                <a:latin typeface="Consolas" panose="020B0609020204030204" pitchFamily="49" charset="0"/>
-              </a:rPr>
-              <a:t>"$schema"</a:t>
-            </a:r>
-            <a:r>
-              <a:rPr lang="de-DE" dirty="0">
-                <a:solidFill>
-                  <a:srgbClr val="000000"/>
-                </a:solidFill>
-                <a:latin typeface="Consolas" panose="020B0609020204030204" pitchFamily="49" charset="0"/>
-              </a:rPr>
-              <a:t>: </a:t>
-            </a:r>
-            <a:r>
-              <a:rPr lang="de-DE" dirty="0">
-                <a:solidFill>
-                  <a:srgbClr val="A31515"/>
-                </a:solidFill>
-                <a:latin typeface="Consolas" panose="020B0609020204030204" pitchFamily="49" charset="0"/>
-              </a:rPr>
-              <a:t>"https://schema.management.azure.com/schemas/2015-01-01/deploymentTemplate.json#"</a:t>
-            </a:r>
-            <a:r>
-              <a:rPr lang="de-DE" dirty="0">
-                <a:solidFill>
-                  <a:srgbClr val="000000"/>
-                </a:solidFill>
-                <a:latin typeface="Consolas" panose="020B0609020204030204" pitchFamily="49" charset="0"/>
-              </a:rPr>
-              <a:t>,</a:t>
-            </a:r>
-          </a:p>
-          <a:p>
-            <a:r>
-              <a:rPr lang="en-US" dirty="0">
-                <a:solidFill>
-                  <a:srgbClr val="000000"/>
-                </a:solidFill>
-                <a:latin typeface="Consolas" panose="020B0609020204030204" pitchFamily="49" charset="0"/>
-              </a:rPr>
-              <a:t>    </a:t>
-            </a:r>
-            <a:r>
-              <a:rPr lang="en-US" dirty="0">
-                <a:solidFill>
-                  <a:srgbClr val="2E75B6"/>
-                </a:solidFill>
-                <a:latin typeface="Consolas" panose="020B0609020204030204" pitchFamily="49" charset="0"/>
-              </a:rPr>
-              <a:t>"</a:t>
-            </a:r>
-            <a:r>
-              <a:rPr lang="en-US" dirty="0" err="1">
-                <a:solidFill>
-                  <a:srgbClr val="2E75B6"/>
-                </a:solidFill>
-                <a:latin typeface="Consolas" panose="020B0609020204030204" pitchFamily="49" charset="0"/>
-              </a:rPr>
-              <a:t>contentVersion</a:t>
-            </a:r>
-            <a:r>
-              <a:rPr lang="en-US" dirty="0">
-                <a:solidFill>
-                  <a:srgbClr val="2E75B6"/>
-                </a:solidFill>
-                <a:latin typeface="Consolas" panose="020B0609020204030204" pitchFamily="49" charset="0"/>
-              </a:rPr>
-              <a:t>"</a:t>
-            </a:r>
-            <a:r>
-              <a:rPr lang="en-US" dirty="0">
-                <a:solidFill>
-                  <a:srgbClr val="000000"/>
-                </a:solidFill>
-                <a:latin typeface="Consolas" panose="020B0609020204030204" pitchFamily="49" charset="0"/>
-              </a:rPr>
-              <a:t>: </a:t>
-            </a:r>
-            <a:r>
-              <a:rPr lang="en-US" dirty="0">
-                <a:solidFill>
-                  <a:srgbClr val="A31515"/>
-                </a:solidFill>
-                <a:latin typeface="Consolas" panose="020B0609020204030204" pitchFamily="49" charset="0"/>
-              </a:rPr>
-              <a:t>"1.0.0.0"</a:t>
-            </a:r>
-            <a:r>
-              <a:rPr lang="en-US" dirty="0">
-                <a:solidFill>
-                  <a:srgbClr val="000000"/>
-                </a:solidFill>
-                <a:latin typeface="Consolas" panose="020B0609020204030204" pitchFamily="49" charset="0"/>
-              </a:rPr>
-              <a:t>,</a:t>
-            </a:r>
-          </a:p>
-          <a:p>
-            <a:r>
-              <a:rPr lang="en-US" dirty="0">
-                <a:solidFill>
-                  <a:srgbClr val="000000"/>
-                </a:solidFill>
-                <a:latin typeface="Consolas" panose="020B0609020204030204" pitchFamily="49" charset="0"/>
-              </a:rPr>
-              <a:t>    </a:t>
-            </a:r>
-            <a:r>
-              <a:rPr lang="en-US" dirty="0">
-                <a:solidFill>
-                  <a:srgbClr val="2E75B6"/>
-                </a:solidFill>
-                <a:latin typeface="Consolas" panose="020B0609020204030204" pitchFamily="49" charset="0"/>
-              </a:rPr>
-              <a:t>"resources"</a:t>
-            </a:r>
-            <a:r>
-              <a:rPr lang="en-US" dirty="0">
-                <a:solidFill>
-                  <a:srgbClr val="000000"/>
-                </a:solidFill>
-                <a:latin typeface="Consolas" panose="020B0609020204030204" pitchFamily="49" charset="0"/>
-              </a:rPr>
-              <a:t>: [</a:t>
-            </a:r>
-          </a:p>
-          <a:p>
-            <a:r>
-              <a:rPr lang="en-US" dirty="0">
-                <a:solidFill>
-                  <a:srgbClr val="000000"/>
-                </a:solidFill>
-                <a:latin typeface="Consolas" panose="020B0609020204030204" pitchFamily="49" charset="0"/>
-              </a:rPr>
-              <a:t>        {</a:t>
-            </a:r>
-          </a:p>
-          <a:p>
-            <a:r>
-              <a:rPr lang="en-US" dirty="0">
-                <a:solidFill>
-                  <a:srgbClr val="000000"/>
-                </a:solidFill>
-                <a:latin typeface="Consolas" panose="020B0609020204030204" pitchFamily="49" charset="0"/>
-              </a:rPr>
-              <a:t>            </a:t>
-            </a:r>
-            <a:r>
-              <a:rPr lang="en-US" dirty="0">
-                <a:solidFill>
-                  <a:srgbClr val="2E75B6"/>
-                </a:solidFill>
-                <a:latin typeface="Consolas" panose="020B0609020204030204" pitchFamily="49" charset="0"/>
-              </a:rPr>
-              <a:t>"type"</a:t>
-            </a:r>
-            <a:r>
-              <a:rPr lang="en-US" dirty="0">
-                <a:solidFill>
-                  <a:srgbClr val="000000"/>
-                </a:solidFill>
-                <a:latin typeface="Consolas" panose="020B0609020204030204" pitchFamily="49" charset="0"/>
-              </a:rPr>
-              <a:t>: </a:t>
-            </a:r>
-            <a:r>
-              <a:rPr lang="en-US" dirty="0">
-                <a:solidFill>
-                  <a:srgbClr val="A31515"/>
-                </a:solidFill>
-                <a:latin typeface="Consolas" panose="020B0609020204030204" pitchFamily="49" charset="0"/>
-              </a:rPr>
-              <a:t>"</a:t>
-            </a:r>
-            <a:r>
-              <a:rPr lang="en-US" dirty="0" err="1">
-                <a:solidFill>
-                  <a:srgbClr val="A31515"/>
-                </a:solidFill>
-                <a:latin typeface="Consolas" panose="020B0609020204030204" pitchFamily="49" charset="0"/>
-              </a:rPr>
-              <a:t>Microsoft.Web</a:t>
-            </a:r>
-            <a:r>
-              <a:rPr lang="en-US" dirty="0">
-                <a:solidFill>
-                  <a:srgbClr val="A31515"/>
-                </a:solidFill>
-                <a:latin typeface="Consolas" panose="020B0609020204030204" pitchFamily="49" charset="0"/>
-              </a:rPr>
-              <a:t>/</a:t>
-            </a:r>
-            <a:r>
-              <a:rPr lang="en-US" dirty="0" err="1">
-                <a:solidFill>
-                  <a:srgbClr val="A31515"/>
-                </a:solidFill>
-                <a:latin typeface="Consolas" panose="020B0609020204030204" pitchFamily="49" charset="0"/>
-              </a:rPr>
-              <a:t>serverfarms</a:t>
-            </a:r>
-            <a:r>
-              <a:rPr lang="en-US" dirty="0">
-                <a:solidFill>
-                  <a:srgbClr val="A31515"/>
-                </a:solidFill>
-                <a:latin typeface="Consolas" panose="020B0609020204030204" pitchFamily="49" charset="0"/>
-              </a:rPr>
-              <a:t>"</a:t>
-            </a:r>
-            <a:r>
-              <a:rPr lang="en-US" dirty="0">
-                <a:solidFill>
-                  <a:srgbClr val="000000"/>
-                </a:solidFill>
-                <a:latin typeface="Consolas" panose="020B0609020204030204" pitchFamily="49" charset="0"/>
-              </a:rPr>
-              <a:t>,</a:t>
-            </a:r>
-          </a:p>
-          <a:p>
-            <a:r>
-              <a:rPr lang="en-US" dirty="0">
-                <a:solidFill>
-                  <a:srgbClr val="000000"/>
-                </a:solidFill>
-                <a:latin typeface="Consolas" panose="020B0609020204030204" pitchFamily="49" charset="0"/>
-              </a:rPr>
-              <a:t>            </a:t>
-            </a:r>
-            <a:r>
-              <a:rPr lang="en-US" dirty="0">
-                <a:solidFill>
-                  <a:srgbClr val="2E75B6"/>
-                </a:solidFill>
-                <a:latin typeface="Consolas" panose="020B0609020204030204" pitchFamily="49" charset="0"/>
-              </a:rPr>
-              <a:t>"</a:t>
-            </a:r>
-            <a:r>
-              <a:rPr lang="en-US" dirty="0" err="1">
-                <a:solidFill>
-                  <a:srgbClr val="2E75B6"/>
-                </a:solidFill>
-                <a:latin typeface="Consolas" panose="020B0609020204030204" pitchFamily="49" charset="0"/>
-              </a:rPr>
-              <a:t>sku</a:t>
-            </a:r>
-            <a:r>
-              <a:rPr lang="en-US" dirty="0">
-                <a:solidFill>
-                  <a:srgbClr val="2E75B6"/>
-                </a:solidFill>
-                <a:latin typeface="Consolas" panose="020B0609020204030204" pitchFamily="49" charset="0"/>
-              </a:rPr>
-              <a:t>"</a:t>
-            </a:r>
-            <a:r>
-              <a:rPr lang="en-US" dirty="0">
-                <a:solidFill>
-                  <a:srgbClr val="000000"/>
-                </a:solidFill>
-                <a:latin typeface="Consolas" panose="020B0609020204030204" pitchFamily="49" charset="0"/>
-              </a:rPr>
-              <a:t>: {</a:t>
-            </a:r>
-          </a:p>
-          <a:p>
-            <a:r>
-              <a:rPr lang="en-US" dirty="0">
-                <a:solidFill>
-                  <a:srgbClr val="000000"/>
-                </a:solidFill>
-                <a:latin typeface="Consolas" panose="020B0609020204030204" pitchFamily="49" charset="0"/>
-              </a:rPr>
-              <a:t>                </a:t>
-            </a:r>
-            <a:r>
-              <a:rPr lang="en-US" dirty="0">
-                <a:solidFill>
-                  <a:srgbClr val="2E75B6"/>
-                </a:solidFill>
-                <a:latin typeface="Consolas" panose="020B0609020204030204" pitchFamily="49" charset="0"/>
-              </a:rPr>
-              <a:t>"name"</a:t>
-            </a:r>
-            <a:r>
-              <a:rPr lang="en-US" dirty="0">
-                <a:solidFill>
-                  <a:srgbClr val="000000"/>
-                </a:solidFill>
-                <a:latin typeface="Consolas" panose="020B0609020204030204" pitchFamily="49" charset="0"/>
-              </a:rPr>
-              <a:t>: </a:t>
-            </a:r>
-            <a:r>
-              <a:rPr lang="en-US" dirty="0">
-                <a:solidFill>
-                  <a:srgbClr val="A31515"/>
-                </a:solidFill>
-                <a:latin typeface="Consolas" panose="020B0609020204030204" pitchFamily="49" charset="0"/>
-              </a:rPr>
-              <a:t>"D1"</a:t>
-            </a:r>
-            <a:r>
-              <a:rPr lang="en-US" dirty="0">
-                <a:solidFill>
-                  <a:srgbClr val="000000"/>
-                </a:solidFill>
-                <a:latin typeface="Consolas" panose="020B0609020204030204" pitchFamily="49" charset="0"/>
-              </a:rPr>
-              <a:t>,</a:t>
-            </a:r>
-          </a:p>
-          <a:p>
-            <a:r>
-              <a:rPr lang="en-US" dirty="0">
-                <a:solidFill>
-                  <a:srgbClr val="000000"/>
-                </a:solidFill>
-                <a:latin typeface="Consolas" panose="020B0609020204030204" pitchFamily="49" charset="0"/>
-              </a:rPr>
-              <a:t>                </a:t>
-            </a:r>
-            <a:r>
-              <a:rPr lang="en-US" dirty="0">
-                <a:solidFill>
-                  <a:srgbClr val="2E75B6"/>
-                </a:solidFill>
-                <a:latin typeface="Consolas" panose="020B0609020204030204" pitchFamily="49" charset="0"/>
-              </a:rPr>
-              <a:t>"tier"</a:t>
-            </a:r>
-            <a:r>
-              <a:rPr lang="en-US" dirty="0">
-                <a:solidFill>
-                  <a:srgbClr val="000000"/>
-                </a:solidFill>
-                <a:latin typeface="Consolas" panose="020B0609020204030204" pitchFamily="49" charset="0"/>
-              </a:rPr>
-              <a:t>: </a:t>
-            </a:r>
-            <a:r>
-              <a:rPr lang="en-US" dirty="0">
-                <a:solidFill>
-                  <a:srgbClr val="A31515"/>
-                </a:solidFill>
-                <a:latin typeface="Consolas" panose="020B0609020204030204" pitchFamily="49" charset="0"/>
-              </a:rPr>
-              <a:t>"Shared"</a:t>
-            </a:r>
-            <a:r>
-              <a:rPr lang="en-US" dirty="0">
-                <a:solidFill>
-                  <a:srgbClr val="000000"/>
-                </a:solidFill>
-                <a:latin typeface="Consolas" panose="020B0609020204030204" pitchFamily="49" charset="0"/>
-              </a:rPr>
-              <a:t>,</a:t>
-            </a:r>
-          </a:p>
-          <a:p>
-            <a:r>
-              <a:rPr lang="en-US" dirty="0">
-                <a:solidFill>
-                  <a:srgbClr val="000000"/>
-                </a:solidFill>
-                <a:latin typeface="Consolas" panose="020B0609020204030204" pitchFamily="49" charset="0"/>
-              </a:rPr>
-              <a:t>                </a:t>
-            </a:r>
-            <a:r>
-              <a:rPr lang="en-US" dirty="0">
-                <a:solidFill>
-                  <a:srgbClr val="2E75B6"/>
-                </a:solidFill>
-                <a:latin typeface="Consolas" panose="020B0609020204030204" pitchFamily="49" charset="0"/>
-              </a:rPr>
-              <a:t>"size"</a:t>
-            </a:r>
-            <a:r>
-              <a:rPr lang="en-US" dirty="0">
-                <a:solidFill>
-                  <a:srgbClr val="000000"/>
-                </a:solidFill>
-                <a:latin typeface="Consolas" panose="020B0609020204030204" pitchFamily="49" charset="0"/>
-              </a:rPr>
-              <a:t>: </a:t>
-            </a:r>
-            <a:r>
-              <a:rPr lang="en-US" dirty="0">
-                <a:solidFill>
-                  <a:srgbClr val="A31515"/>
-                </a:solidFill>
-                <a:latin typeface="Consolas" panose="020B0609020204030204" pitchFamily="49" charset="0"/>
-              </a:rPr>
-              <a:t>"D1"</a:t>
-            </a:r>
-            <a:r>
-              <a:rPr lang="en-US" dirty="0">
-                <a:solidFill>
-                  <a:srgbClr val="000000"/>
-                </a:solidFill>
-                <a:latin typeface="Consolas" panose="020B0609020204030204" pitchFamily="49" charset="0"/>
-              </a:rPr>
-              <a:t>,</a:t>
-            </a:r>
-          </a:p>
-          <a:p>
-            <a:r>
-              <a:rPr lang="en-US" dirty="0">
-                <a:solidFill>
-                  <a:srgbClr val="000000"/>
-                </a:solidFill>
-                <a:latin typeface="Consolas" panose="020B0609020204030204" pitchFamily="49" charset="0"/>
-              </a:rPr>
-              <a:t>                </a:t>
-            </a:r>
-            <a:r>
-              <a:rPr lang="en-US" dirty="0">
-                <a:solidFill>
-                  <a:srgbClr val="2E75B6"/>
-                </a:solidFill>
-                <a:latin typeface="Consolas" panose="020B0609020204030204" pitchFamily="49" charset="0"/>
-              </a:rPr>
-              <a:t>"family"</a:t>
-            </a:r>
-            <a:r>
-              <a:rPr lang="en-US" dirty="0">
-                <a:solidFill>
-                  <a:srgbClr val="000000"/>
-                </a:solidFill>
-                <a:latin typeface="Consolas" panose="020B0609020204030204" pitchFamily="49" charset="0"/>
-              </a:rPr>
-              <a:t>: </a:t>
-            </a:r>
-            <a:r>
-              <a:rPr lang="en-US" dirty="0">
-                <a:solidFill>
-                  <a:srgbClr val="A31515"/>
-                </a:solidFill>
-                <a:latin typeface="Consolas" panose="020B0609020204030204" pitchFamily="49" charset="0"/>
-              </a:rPr>
-              <a:t>"D"</a:t>
-            </a:r>
-            <a:r>
-              <a:rPr lang="en-US" dirty="0">
-                <a:solidFill>
-                  <a:srgbClr val="000000"/>
-                </a:solidFill>
-                <a:latin typeface="Consolas" panose="020B0609020204030204" pitchFamily="49" charset="0"/>
-              </a:rPr>
-              <a:t>,</a:t>
-            </a:r>
-          </a:p>
-          <a:p>
-            <a:r>
-              <a:rPr lang="en-US" dirty="0">
-                <a:solidFill>
-                  <a:srgbClr val="000000"/>
-                </a:solidFill>
-                <a:latin typeface="Consolas" panose="020B0609020204030204" pitchFamily="49" charset="0"/>
-              </a:rPr>
-              <a:t>                </a:t>
-            </a:r>
-            <a:r>
-              <a:rPr lang="en-US" dirty="0">
-                <a:solidFill>
-                  <a:srgbClr val="2E75B6"/>
-                </a:solidFill>
-                <a:latin typeface="Consolas" panose="020B0609020204030204" pitchFamily="49" charset="0"/>
-              </a:rPr>
-              <a:t>"capacity"</a:t>
-            </a:r>
-            <a:r>
-              <a:rPr lang="en-US" dirty="0">
-                <a:solidFill>
-                  <a:srgbClr val="000000"/>
-                </a:solidFill>
-                <a:latin typeface="Consolas" panose="020B0609020204030204" pitchFamily="49" charset="0"/>
-              </a:rPr>
-              <a:t>: 0</a:t>
-            </a:r>
-          </a:p>
-          <a:p>
-            <a:r>
-              <a:rPr lang="en-US" dirty="0">
-                <a:solidFill>
-                  <a:srgbClr val="000000"/>
-                </a:solidFill>
-                <a:latin typeface="Consolas" panose="020B0609020204030204" pitchFamily="49" charset="0"/>
-              </a:rPr>
-              <a:t>            },</a:t>
-            </a:r>
-          </a:p>
-          <a:p>
-            <a:r>
-              <a:rPr lang="en-US" dirty="0">
-                <a:solidFill>
-                  <a:srgbClr val="000000"/>
-                </a:solidFill>
-                <a:latin typeface="Consolas" panose="020B0609020204030204" pitchFamily="49" charset="0"/>
-              </a:rPr>
-              <a:t>            </a:t>
-            </a:r>
-            <a:r>
-              <a:rPr lang="en-US" dirty="0">
-                <a:solidFill>
-                  <a:srgbClr val="2E75B6"/>
-                </a:solidFill>
-                <a:latin typeface="Consolas" panose="020B0609020204030204" pitchFamily="49" charset="0"/>
-              </a:rPr>
-              <a:t>"kind"</a:t>
-            </a:r>
-            <a:r>
-              <a:rPr lang="en-US" dirty="0">
-                <a:solidFill>
-                  <a:srgbClr val="000000"/>
-                </a:solidFill>
-                <a:latin typeface="Consolas" panose="020B0609020204030204" pitchFamily="49" charset="0"/>
-              </a:rPr>
-              <a:t>: </a:t>
-            </a:r>
-            <a:r>
-              <a:rPr lang="en-US" dirty="0">
-                <a:solidFill>
-                  <a:srgbClr val="A31515"/>
-                </a:solidFill>
-                <a:latin typeface="Consolas" panose="020B0609020204030204" pitchFamily="49" charset="0"/>
-              </a:rPr>
-              <a:t>"app"</a:t>
-            </a:r>
-            <a:r>
-              <a:rPr lang="en-US" dirty="0">
-                <a:solidFill>
-                  <a:srgbClr val="000000"/>
-                </a:solidFill>
-                <a:latin typeface="Consolas" panose="020B0609020204030204" pitchFamily="49" charset="0"/>
-              </a:rPr>
-              <a:t>,</a:t>
-            </a:r>
-          </a:p>
-          <a:p>
-            <a:r>
-              <a:rPr lang="en-US" dirty="0">
-                <a:solidFill>
-                  <a:srgbClr val="000000"/>
-                </a:solidFill>
-                <a:latin typeface="Consolas" panose="020B0609020204030204" pitchFamily="49" charset="0"/>
-              </a:rPr>
-              <a:t>            </a:t>
-            </a:r>
-            <a:r>
-              <a:rPr lang="en-US" dirty="0">
-                <a:solidFill>
-                  <a:srgbClr val="2E75B6"/>
-                </a:solidFill>
-                <a:latin typeface="Consolas" panose="020B0609020204030204" pitchFamily="49" charset="0"/>
-              </a:rPr>
-              <a:t>"name"</a:t>
-            </a:r>
-            <a:r>
-              <a:rPr lang="en-US" dirty="0">
-                <a:solidFill>
-                  <a:srgbClr val="000000"/>
-                </a:solidFill>
-                <a:latin typeface="Consolas" panose="020B0609020204030204" pitchFamily="49" charset="0"/>
-              </a:rPr>
-              <a:t>: </a:t>
-            </a:r>
-            <a:r>
-              <a:rPr lang="en-US" dirty="0">
-                <a:solidFill>
-                  <a:srgbClr val="A31515"/>
-                </a:solidFill>
-                <a:latin typeface="Consolas" panose="020B0609020204030204" pitchFamily="49" charset="0"/>
-              </a:rPr>
-              <a:t>"[parameters('</a:t>
-            </a:r>
-            <a:r>
-              <a:rPr lang="en-US" dirty="0" err="1">
-                <a:solidFill>
-                  <a:srgbClr val="A31515"/>
-                </a:solidFill>
-                <a:latin typeface="Consolas" panose="020B0609020204030204" pitchFamily="49" charset="0"/>
-              </a:rPr>
-              <a:t>serverfarms_AzureUGBGWeb_name</a:t>
-            </a:r>
-            <a:r>
-              <a:rPr lang="en-US" dirty="0">
-                <a:solidFill>
-                  <a:srgbClr val="A31515"/>
-                </a:solidFill>
-                <a:latin typeface="Consolas" panose="020B0609020204030204" pitchFamily="49" charset="0"/>
-              </a:rPr>
-              <a:t>')]"</a:t>
-            </a:r>
-            <a:r>
-              <a:rPr lang="en-US" dirty="0">
-                <a:solidFill>
-                  <a:srgbClr val="000000"/>
-                </a:solidFill>
-                <a:latin typeface="Consolas" panose="020B0609020204030204" pitchFamily="49" charset="0"/>
-              </a:rPr>
-              <a:t>,</a:t>
-            </a:r>
-          </a:p>
-          <a:p>
-            <a:r>
-              <a:rPr lang="en-US" dirty="0">
-                <a:solidFill>
-                  <a:srgbClr val="000000"/>
-                </a:solidFill>
-                <a:latin typeface="Consolas" panose="020B0609020204030204" pitchFamily="49" charset="0"/>
-              </a:rPr>
-              <a:t>            </a:t>
-            </a:r>
-            <a:r>
-              <a:rPr lang="en-US" dirty="0">
-                <a:solidFill>
-                  <a:srgbClr val="2E75B6"/>
-                </a:solidFill>
-                <a:latin typeface="Consolas" panose="020B0609020204030204" pitchFamily="49" charset="0"/>
-              </a:rPr>
-              <a:t>"</a:t>
-            </a:r>
-            <a:r>
-              <a:rPr lang="en-US" dirty="0" err="1">
-                <a:solidFill>
-                  <a:srgbClr val="2E75B6"/>
-                </a:solidFill>
-                <a:latin typeface="Consolas" panose="020B0609020204030204" pitchFamily="49" charset="0"/>
-              </a:rPr>
-              <a:t>apiVersion</a:t>
-            </a:r>
-            <a:r>
-              <a:rPr lang="en-US" dirty="0">
-                <a:solidFill>
-                  <a:srgbClr val="2E75B6"/>
-                </a:solidFill>
-                <a:latin typeface="Consolas" panose="020B0609020204030204" pitchFamily="49" charset="0"/>
-              </a:rPr>
-              <a:t>"</a:t>
-            </a:r>
-            <a:r>
-              <a:rPr lang="en-US" dirty="0">
-                <a:solidFill>
-                  <a:srgbClr val="000000"/>
-                </a:solidFill>
-                <a:latin typeface="Consolas" panose="020B0609020204030204" pitchFamily="49" charset="0"/>
-              </a:rPr>
-              <a:t>: </a:t>
-            </a:r>
-            <a:r>
-              <a:rPr lang="en-US" dirty="0">
-                <a:solidFill>
-                  <a:srgbClr val="A31515"/>
-                </a:solidFill>
-                <a:latin typeface="Consolas" panose="020B0609020204030204" pitchFamily="49" charset="0"/>
-              </a:rPr>
-              <a:t>"2016-09-01"</a:t>
-            </a:r>
-            <a:r>
-              <a:rPr lang="en-US" dirty="0">
-                <a:solidFill>
-                  <a:srgbClr val="000000"/>
-                </a:solidFill>
-                <a:latin typeface="Consolas" panose="020B0609020204030204" pitchFamily="49" charset="0"/>
-              </a:rPr>
-              <a:t>,</a:t>
-            </a:r>
-          </a:p>
-          <a:p>
-            <a:r>
-              <a:rPr lang="en-US" dirty="0">
-                <a:solidFill>
-                  <a:srgbClr val="000000"/>
-                </a:solidFill>
-                <a:latin typeface="Consolas" panose="020B0609020204030204" pitchFamily="49" charset="0"/>
-              </a:rPr>
-              <a:t>            </a:t>
-            </a:r>
-            <a:r>
-              <a:rPr lang="en-US" sz="2400" b="1" dirty="0">
-                <a:solidFill>
-                  <a:srgbClr val="2E75B6"/>
-                </a:solidFill>
-                <a:latin typeface="Consolas" panose="020B0609020204030204" pitchFamily="49" charset="0"/>
-              </a:rPr>
-              <a:t>"location"</a:t>
-            </a:r>
-            <a:r>
-              <a:rPr lang="en-US" sz="2400" b="1" dirty="0">
-                <a:solidFill>
-                  <a:srgbClr val="000000"/>
-                </a:solidFill>
-                <a:latin typeface="Consolas" panose="020B0609020204030204" pitchFamily="49" charset="0"/>
-              </a:rPr>
-              <a:t>: </a:t>
-            </a:r>
-            <a:r>
-              <a:rPr lang="en-US" sz="2400" b="1" dirty="0">
-                <a:solidFill>
-                  <a:srgbClr val="A31515"/>
-                </a:solidFill>
-                <a:latin typeface="Consolas" panose="020B0609020204030204" pitchFamily="49" charset="0"/>
-              </a:rPr>
-              <a:t>"West Europe"</a:t>
-            </a:r>
-            <a:r>
-              <a:rPr lang="en-US" sz="2400" b="1" dirty="0">
-                <a:solidFill>
-                  <a:srgbClr val="000000"/>
-                </a:solidFill>
-                <a:latin typeface="Consolas" panose="020B0609020204030204" pitchFamily="49" charset="0"/>
-              </a:rPr>
-              <a:t>,</a:t>
-            </a:r>
-          </a:p>
-          <a:p>
-            <a:r>
-              <a:rPr lang="en-US" dirty="0">
-                <a:solidFill>
-                  <a:srgbClr val="000000"/>
-                </a:solidFill>
-                <a:latin typeface="Consolas" panose="020B0609020204030204" pitchFamily="49" charset="0"/>
-              </a:rPr>
-              <a:t>            </a:t>
-            </a:r>
-            <a:r>
-              <a:rPr lang="en-US" dirty="0">
-                <a:solidFill>
-                  <a:srgbClr val="2E75B6"/>
-                </a:solidFill>
-                <a:latin typeface="Consolas" panose="020B0609020204030204" pitchFamily="49" charset="0"/>
-              </a:rPr>
-              <a:t>"scale"</a:t>
-            </a:r>
-            <a:r>
-              <a:rPr lang="en-US" dirty="0">
-                <a:solidFill>
-                  <a:srgbClr val="000000"/>
-                </a:solidFill>
-                <a:latin typeface="Consolas" panose="020B0609020204030204" pitchFamily="49" charset="0"/>
-              </a:rPr>
-              <a:t>: </a:t>
-            </a:r>
-            <a:r>
-              <a:rPr lang="en-US" dirty="0">
-                <a:solidFill>
-                  <a:srgbClr val="0000FF"/>
-                </a:solidFill>
-                <a:latin typeface="Consolas" panose="020B0609020204030204" pitchFamily="49" charset="0"/>
-              </a:rPr>
-              <a:t>null</a:t>
-            </a:r>
-            <a:r>
-              <a:rPr lang="en-US" dirty="0">
-                <a:solidFill>
-                  <a:srgbClr val="000000"/>
-                </a:solidFill>
-                <a:latin typeface="Consolas" panose="020B0609020204030204" pitchFamily="49" charset="0"/>
-              </a:rPr>
-              <a:t>,</a:t>
-            </a:r>
-          </a:p>
-          <a:p>
-            <a:r>
-              <a:rPr lang="en-US" dirty="0">
-                <a:solidFill>
-                  <a:srgbClr val="000000"/>
-                </a:solidFill>
-                <a:latin typeface="Consolas" panose="020B0609020204030204" pitchFamily="49" charset="0"/>
-              </a:rPr>
-              <a:t>            </a:t>
-            </a:r>
-            <a:r>
-              <a:rPr lang="en-US" dirty="0">
-                <a:solidFill>
-                  <a:srgbClr val="2E75B6"/>
-                </a:solidFill>
-                <a:latin typeface="Consolas" panose="020B0609020204030204" pitchFamily="49" charset="0"/>
-              </a:rPr>
-              <a:t>"</a:t>
-            </a:r>
-            <a:r>
-              <a:rPr lang="en-US" dirty="0" err="1">
-                <a:solidFill>
-                  <a:srgbClr val="2E75B6"/>
-                </a:solidFill>
-                <a:latin typeface="Consolas" panose="020B0609020204030204" pitchFamily="49" charset="0"/>
-              </a:rPr>
-              <a:t>dependsOn</a:t>
-            </a:r>
-            <a:r>
-              <a:rPr lang="en-US" dirty="0">
-                <a:solidFill>
-                  <a:srgbClr val="2E75B6"/>
-                </a:solidFill>
-                <a:latin typeface="Consolas" panose="020B0609020204030204" pitchFamily="49" charset="0"/>
-              </a:rPr>
-              <a:t>"</a:t>
-            </a:r>
-            <a:r>
-              <a:rPr lang="en-US" dirty="0">
-                <a:solidFill>
-                  <a:srgbClr val="000000"/>
-                </a:solidFill>
-                <a:latin typeface="Consolas" panose="020B0609020204030204" pitchFamily="49" charset="0"/>
-              </a:rPr>
-              <a:t>: []</a:t>
-            </a:r>
-          </a:p>
-          <a:p>
-            <a:r>
-              <a:rPr lang="en-US" dirty="0">
-                <a:solidFill>
-                  <a:srgbClr val="000000"/>
-                </a:solidFill>
-                <a:latin typeface="Consolas" panose="020B0609020204030204" pitchFamily="49" charset="0"/>
-              </a:rPr>
-              <a:t>        }</a:t>
-            </a:r>
-          </a:p>
-          <a:p>
-            <a:r>
-              <a:rPr lang="en-US" dirty="0">
-                <a:solidFill>
-                  <a:srgbClr val="000000"/>
-                </a:solidFill>
-                <a:latin typeface="Consolas" panose="020B0609020204030204" pitchFamily="49" charset="0"/>
-              </a:rPr>
-              <a:t>    ]</a:t>
-            </a:r>
-          </a:p>
-          <a:p>
-            <a:r>
-              <a:rPr lang="en-US" dirty="0">
-                <a:solidFill>
-                  <a:srgbClr val="000000"/>
-                </a:solidFill>
-                <a:latin typeface="Consolas" panose="020B0609020204030204" pitchFamily="49" charset="0"/>
-              </a:rPr>
-              <a:t>}</a:t>
+              <a:rPr lang="en-US" b="1" dirty="0"/>
+              <a:t>equals</a:t>
+            </a:r>
+          </a:p>
+          <a:p>
+            <a:r>
+              <a:rPr lang="en-US" b="1" dirty="0"/>
+              <a:t>like</a:t>
+            </a:r>
+          </a:p>
+          <a:p>
+            <a:r>
+              <a:rPr lang="en-US" b="1" dirty="0"/>
+              <a:t>match</a:t>
+            </a:r>
+          </a:p>
+          <a:p>
+            <a:r>
+              <a:rPr lang="en-US" b="1" dirty="0"/>
+              <a:t>contains</a:t>
+            </a:r>
+          </a:p>
+          <a:p>
+            <a:r>
+              <a:rPr lang="en-US" b="1" dirty="0"/>
+              <a:t>in</a:t>
             </a:r>
             <a:endParaRPr lang="en-US" dirty="0"/>
+          </a:p>
+          <a:p>
+            <a:r>
+              <a:rPr lang="en-US" b="1" dirty="0" err="1"/>
+              <a:t>containsKey</a:t>
+            </a:r>
+            <a:endParaRPr lang="en-US" dirty="0"/>
+          </a:p>
+          <a:p>
+            <a:r>
+              <a:rPr lang="en-US" b="1" dirty="0"/>
+              <a:t>exists</a:t>
+            </a:r>
+            <a:endParaRPr lang="en-US" dirty="0"/>
+          </a:p>
+        </p:txBody>
+      </p:sp>
+      <p:sp>
+        <p:nvSpPr>
+          <p:cNvPr id="3" name="Title 2">
+            <a:extLst>
+              <a:ext uri="{FF2B5EF4-FFF2-40B4-BE49-F238E27FC236}">
+                <a16:creationId xmlns:a16="http://schemas.microsoft.com/office/drawing/2014/main" id="{B63BF04D-3A3F-4416-BDA6-6CA65511D55A}"/>
+              </a:ext>
+            </a:extLst>
+          </p:cNvPr>
+          <p:cNvSpPr>
+            <a:spLocks noGrp="1"/>
+          </p:cNvSpPr>
+          <p:nvPr>
+            <p:ph type="title"/>
+          </p:nvPr>
+        </p:nvSpPr>
+        <p:spPr/>
+        <p:txBody>
+          <a:bodyPr/>
+          <a:lstStyle/>
+          <a:p>
+            <a:r>
+              <a:rPr lang="en-US" dirty="0"/>
+              <a:t>Criteria</a:t>
+            </a:r>
           </a:p>
         </p:txBody>
       </p:sp>
     </p:spTree>
     <p:extLst>
       <p:ext uri="{BB962C8B-B14F-4D97-AF65-F5344CB8AC3E}">
-        <p14:creationId xmlns:p14="http://schemas.microsoft.com/office/powerpoint/2010/main" val="1567756374"/>
+        <p14:creationId xmlns:p14="http://schemas.microsoft.com/office/powerpoint/2010/main" val="829054741"/>
       </p:ext>
     </p:extLst>
   </p:cSld>
@@ -12380,71 +11439,900 @@
       </p:grpSpPr>
       <p:sp>
         <p:nvSpPr>
-          <p:cNvPr id="2" name="Text Placeholder 1">
+          <p:cNvPr id="2" name="Rectangle 1">
             <a:extLst>
               <a:ext uri="{FF2B5EF4-FFF2-40B4-BE49-F238E27FC236}">
-                <a16:creationId xmlns:a16="http://schemas.microsoft.com/office/drawing/2014/main" id="{FD9C373F-AB4A-4296-B0A7-0652F150A07D}"/>
+                <a16:creationId xmlns:a16="http://schemas.microsoft.com/office/drawing/2014/main" id="{51CF792F-9932-4AA9-B83D-67891540CBBC}"/>
               </a:ext>
             </a:extLst>
           </p:cNvPr>
-          <p:cNvSpPr>
-            <a:spLocks noGrp="1"/>
-          </p:cNvSpPr>
-          <p:nvPr>
-            <p:ph type="body" sz="quarter" idx="10"/>
-          </p:nvPr>
+          <p:cNvSpPr/>
+          <p:nvPr/>
         </p:nvSpPr>
         <p:spPr>
           <a:xfrm>
-            <a:off x="269239" y="1189177"/>
-            <a:ext cx="11653523" cy="4709944"/>
+            <a:off x="-1" y="270185"/>
+            <a:ext cx="12566073" cy="6278642"/>
           </a:xfrm>
+          <a:prstGeom prst="rect">
+            <a:avLst/>
+          </a:prstGeom>
         </p:spPr>
         <p:txBody>
-          <a:bodyPr/>
+          <a:bodyPr wrap="square">
+            <a:spAutoFit/>
+          </a:bodyPr>
           <a:lstStyle/>
           <a:p>
             <a:r>
-              <a:rPr lang="en-US" b="1" dirty="0"/>
-              <a:t>equals</a:t>
-            </a:r>
-          </a:p>
-          <a:p>
-            <a:r>
-              <a:rPr lang="en-US" b="1" dirty="0"/>
-              <a:t>like</a:t>
-            </a:r>
-          </a:p>
-          <a:p>
-            <a:r>
-              <a:rPr lang="en-US" b="1" dirty="0"/>
-              <a:t>match</a:t>
-            </a:r>
-          </a:p>
-          <a:p>
-            <a:r>
-              <a:rPr lang="en-US" b="1" dirty="0"/>
-              <a:t>contains</a:t>
-            </a:r>
-          </a:p>
-          <a:p>
-            <a:r>
-              <a:rPr lang="en-US" b="1" dirty="0"/>
-              <a:t>in</a:t>
-            </a:r>
-            <a:endParaRPr lang="en-US" dirty="0"/>
-          </a:p>
-          <a:p>
-            <a:r>
-              <a:rPr lang="en-US" b="1" dirty="0" err="1"/>
-              <a:t>containsKey</a:t>
-            </a:r>
-            <a:endParaRPr lang="en-US" dirty="0"/>
-          </a:p>
-          <a:p>
-            <a:r>
-              <a:rPr lang="en-US" b="1" dirty="0"/>
-              <a:t>exists</a:t>
+              <a:rPr lang="en-US" dirty="0">
+                <a:solidFill>
+                  <a:srgbClr val="000000"/>
+                </a:solidFill>
+                <a:latin typeface="Consolas" panose="020B0609020204030204" pitchFamily="49" charset="0"/>
+              </a:rPr>
+              <a:t>{</a:t>
+            </a:r>
+          </a:p>
+          <a:p>
+            <a:r>
+              <a:rPr lang="de-DE" dirty="0">
+                <a:solidFill>
+                  <a:srgbClr val="000000"/>
+                </a:solidFill>
+                <a:latin typeface="Consolas" panose="020B0609020204030204" pitchFamily="49" charset="0"/>
+              </a:rPr>
+              <a:t>    </a:t>
+            </a:r>
+            <a:r>
+              <a:rPr lang="de-DE" dirty="0">
+                <a:solidFill>
+                  <a:srgbClr val="2E75B6"/>
+                </a:solidFill>
+                <a:latin typeface="Consolas" panose="020B0609020204030204" pitchFamily="49" charset="0"/>
+              </a:rPr>
+              <a:t>"$schema"</a:t>
+            </a:r>
+            <a:r>
+              <a:rPr lang="de-DE" dirty="0">
+                <a:solidFill>
+                  <a:srgbClr val="000000"/>
+                </a:solidFill>
+                <a:latin typeface="Consolas" panose="020B0609020204030204" pitchFamily="49" charset="0"/>
+              </a:rPr>
+              <a:t>: </a:t>
+            </a:r>
+            <a:r>
+              <a:rPr lang="de-DE" dirty="0">
+                <a:solidFill>
+                  <a:srgbClr val="A31515"/>
+                </a:solidFill>
+                <a:latin typeface="Consolas" panose="020B0609020204030204" pitchFamily="49" charset="0"/>
+              </a:rPr>
+              <a:t>"https://schema.management.azure.com/schemas/2015-01-01/deploymentTemplate.json#"</a:t>
+            </a:r>
+            <a:r>
+              <a:rPr lang="de-DE" dirty="0">
+                <a:solidFill>
+                  <a:srgbClr val="000000"/>
+                </a:solidFill>
+                <a:latin typeface="Consolas" panose="020B0609020204030204" pitchFamily="49" charset="0"/>
+              </a:rPr>
+              <a:t>,</a:t>
+            </a:r>
+          </a:p>
+          <a:p>
+            <a:r>
+              <a:rPr lang="en-US" dirty="0">
+                <a:solidFill>
+                  <a:srgbClr val="000000"/>
+                </a:solidFill>
+                <a:latin typeface="Consolas" panose="020B0609020204030204" pitchFamily="49" charset="0"/>
+              </a:rPr>
+              <a:t>    </a:t>
+            </a:r>
+            <a:r>
+              <a:rPr lang="en-US" dirty="0">
+                <a:solidFill>
+                  <a:srgbClr val="2E75B6"/>
+                </a:solidFill>
+                <a:latin typeface="Consolas" panose="020B0609020204030204" pitchFamily="49" charset="0"/>
+              </a:rPr>
+              <a:t>"</a:t>
+            </a:r>
+            <a:r>
+              <a:rPr lang="en-US" dirty="0" err="1">
+                <a:solidFill>
+                  <a:srgbClr val="2E75B6"/>
+                </a:solidFill>
+                <a:latin typeface="Consolas" panose="020B0609020204030204" pitchFamily="49" charset="0"/>
+              </a:rPr>
+              <a:t>contentVersion</a:t>
+            </a:r>
+            <a:r>
+              <a:rPr lang="en-US" dirty="0">
+                <a:solidFill>
+                  <a:srgbClr val="2E75B6"/>
+                </a:solidFill>
+                <a:latin typeface="Consolas" panose="020B0609020204030204" pitchFamily="49" charset="0"/>
+              </a:rPr>
+              <a:t>"</a:t>
+            </a:r>
+            <a:r>
+              <a:rPr lang="en-US" dirty="0">
+                <a:solidFill>
+                  <a:srgbClr val="000000"/>
+                </a:solidFill>
+                <a:latin typeface="Consolas" panose="020B0609020204030204" pitchFamily="49" charset="0"/>
+              </a:rPr>
+              <a:t>: </a:t>
+            </a:r>
+            <a:r>
+              <a:rPr lang="en-US" dirty="0">
+                <a:solidFill>
+                  <a:srgbClr val="A31515"/>
+                </a:solidFill>
+                <a:latin typeface="Consolas" panose="020B0609020204030204" pitchFamily="49" charset="0"/>
+              </a:rPr>
+              <a:t>"1.0.0.0"</a:t>
+            </a:r>
+            <a:r>
+              <a:rPr lang="en-US" dirty="0">
+                <a:solidFill>
+                  <a:srgbClr val="000000"/>
+                </a:solidFill>
+                <a:latin typeface="Consolas" panose="020B0609020204030204" pitchFamily="49" charset="0"/>
+              </a:rPr>
+              <a:t>,</a:t>
+            </a:r>
+          </a:p>
+          <a:p>
+            <a:r>
+              <a:rPr lang="en-US" dirty="0">
+                <a:solidFill>
+                  <a:srgbClr val="000000"/>
+                </a:solidFill>
+                <a:latin typeface="Consolas" panose="020B0609020204030204" pitchFamily="49" charset="0"/>
+              </a:rPr>
+              <a:t>    </a:t>
+            </a:r>
+            <a:r>
+              <a:rPr lang="en-US" dirty="0">
+                <a:solidFill>
+                  <a:srgbClr val="2E75B6"/>
+                </a:solidFill>
+                <a:latin typeface="Consolas" panose="020B0609020204030204" pitchFamily="49" charset="0"/>
+              </a:rPr>
+              <a:t>"resources"</a:t>
+            </a:r>
+            <a:r>
+              <a:rPr lang="en-US" dirty="0">
+                <a:solidFill>
+                  <a:srgbClr val="000000"/>
+                </a:solidFill>
+                <a:latin typeface="Consolas" panose="020B0609020204030204" pitchFamily="49" charset="0"/>
+              </a:rPr>
+              <a:t>: [</a:t>
+            </a:r>
+          </a:p>
+          <a:p>
+            <a:r>
+              <a:rPr lang="en-US" dirty="0">
+                <a:solidFill>
+                  <a:srgbClr val="000000"/>
+                </a:solidFill>
+                <a:latin typeface="Consolas" panose="020B0609020204030204" pitchFamily="49" charset="0"/>
+              </a:rPr>
+              <a:t>        {</a:t>
+            </a:r>
+          </a:p>
+          <a:p>
+            <a:r>
+              <a:rPr lang="en-US" dirty="0">
+                <a:solidFill>
+                  <a:srgbClr val="000000"/>
+                </a:solidFill>
+                <a:latin typeface="Consolas" panose="020B0609020204030204" pitchFamily="49" charset="0"/>
+              </a:rPr>
+              <a:t>            </a:t>
+            </a:r>
+            <a:r>
+              <a:rPr lang="en-US" dirty="0">
+                <a:solidFill>
+                  <a:srgbClr val="2E75B6"/>
+                </a:solidFill>
+                <a:latin typeface="Consolas" panose="020B0609020204030204" pitchFamily="49" charset="0"/>
+              </a:rPr>
+              <a:t>"type"</a:t>
+            </a:r>
+            <a:r>
+              <a:rPr lang="en-US" dirty="0">
+                <a:solidFill>
+                  <a:srgbClr val="000000"/>
+                </a:solidFill>
+                <a:latin typeface="Consolas" panose="020B0609020204030204" pitchFamily="49" charset="0"/>
+              </a:rPr>
+              <a:t>: </a:t>
+            </a:r>
+            <a:r>
+              <a:rPr lang="en-US" dirty="0">
+                <a:solidFill>
+                  <a:srgbClr val="A31515"/>
+                </a:solidFill>
+                <a:latin typeface="Consolas" panose="020B0609020204030204" pitchFamily="49" charset="0"/>
+              </a:rPr>
+              <a:t>"</a:t>
+            </a:r>
+            <a:r>
+              <a:rPr lang="en-US" dirty="0" err="1">
+                <a:solidFill>
+                  <a:srgbClr val="A31515"/>
+                </a:solidFill>
+                <a:latin typeface="Consolas" panose="020B0609020204030204" pitchFamily="49" charset="0"/>
+              </a:rPr>
+              <a:t>Microsoft.Web</a:t>
+            </a:r>
+            <a:r>
+              <a:rPr lang="en-US" dirty="0">
+                <a:solidFill>
+                  <a:srgbClr val="A31515"/>
+                </a:solidFill>
+                <a:latin typeface="Consolas" panose="020B0609020204030204" pitchFamily="49" charset="0"/>
+              </a:rPr>
+              <a:t>/</a:t>
+            </a:r>
+            <a:r>
+              <a:rPr lang="en-US" dirty="0" err="1">
+                <a:solidFill>
+                  <a:srgbClr val="A31515"/>
+                </a:solidFill>
+                <a:latin typeface="Consolas" panose="020B0609020204030204" pitchFamily="49" charset="0"/>
+              </a:rPr>
+              <a:t>serverfarms</a:t>
+            </a:r>
+            <a:r>
+              <a:rPr lang="en-US" dirty="0">
+                <a:solidFill>
+                  <a:srgbClr val="A31515"/>
+                </a:solidFill>
+                <a:latin typeface="Consolas" panose="020B0609020204030204" pitchFamily="49" charset="0"/>
+              </a:rPr>
+              <a:t>"</a:t>
+            </a:r>
+            <a:r>
+              <a:rPr lang="en-US" dirty="0">
+                <a:solidFill>
+                  <a:srgbClr val="000000"/>
+                </a:solidFill>
+                <a:latin typeface="Consolas" panose="020B0609020204030204" pitchFamily="49" charset="0"/>
+              </a:rPr>
+              <a:t>,</a:t>
+            </a:r>
+          </a:p>
+          <a:p>
+            <a:r>
+              <a:rPr lang="en-US" dirty="0">
+                <a:solidFill>
+                  <a:srgbClr val="000000"/>
+                </a:solidFill>
+                <a:latin typeface="Consolas" panose="020B0609020204030204" pitchFamily="49" charset="0"/>
+              </a:rPr>
+              <a:t>            </a:t>
+            </a:r>
+            <a:r>
+              <a:rPr lang="en-US" dirty="0">
+                <a:solidFill>
+                  <a:srgbClr val="2E75B6"/>
+                </a:solidFill>
+                <a:latin typeface="Consolas" panose="020B0609020204030204" pitchFamily="49" charset="0"/>
+              </a:rPr>
+              <a:t>"</a:t>
+            </a:r>
+            <a:r>
+              <a:rPr lang="en-US" dirty="0" err="1">
+                <a:solidFill>
+                  <a:srgbClr val="2E75B6"/>
+                </a:solidFill>
+                <a:latin typeface="Consolas" panose="020B0609020204030204" pitchFamily="49" charset="0"/>
+              </a:rPr>
+              <a:t>sku</a:t>
+            </a:r>
+            <a:r>
+              <a:rPr lang="en-US" dirty="0">
+                <a:solidFill>
+                  <a:srgbClr val="2E75B6"/>
+                </a:solidFill>
+                <a:latin typeface="Consolas" panose="020B0609020204030204" pitchFamily="49" charset="0"/>
+              </a:rPr>
+              <a:t>"</a:t>
+            </a:r>
+            <a:r>
+              <a:rPr lang="en-US" dirty="0">
+                <a:solidFill>
+                  <a:srgbClr val="000000"/>
+                </a:solidFill>
+                <a:latin typeface="Consolas" panose="020B0609020204030204" pitchFamily="49" charset="0"/>
+              </a:rPr>
+              <a:t>: {</a:t>
+            </a:r>
+          </a:p>
+          <a:p>
+            <a:r>
+              <a:rPr lang="en-US" dirty="0">
+                <a:solidFill>
+                  <a:srgbClr val="000000"/>
+                </a:solidFill>
+                <a:latin typeface="Consolas" panose="020B0609020204030204" pitchFamily="49" charset="0"/>
+              </a:rPr>
+              <a:t>                </a:t>
+            </a:r>
+            <a:r>
+              <a:rPr lang="en-US" dirty="0">
+                <a:solidFill>
+                  <a:srgbClr val="2E75B6"/>
+                </a:solidFill>
+                <a:latin typeface="Consolas" panose="020B0609020204030204" pitchFamily="49" charset="0"/>
+              </a:rPr>
+              <a:t>"name"</a:t>
+            </a:r>
+            <a:r>
+              <a:rPr lang="en-US" dirty="0">
+                <a:solidFill>
+                  <a:srgbClr val="000000"/>
+                </a:solidFill>
+                <a:latin typeface="Consolas" panose="020B0609020204030204" pitchFamily="49" charset="0"/>
+              </a:rPr>
+              <a:t>: </a:t>
+            </a:r>
+            <a:r>
+              <a:rPr lang="en-US" dirty="0">
+                <a:solidFill>
+                  <a:srgbClr val="A31515"/>
+                </a:solidFill>
+                <a:latin typeface="Consolas" panose="020B0609020204030204" pitchFamily="49" charset="0"/>
+              </a:rPr>
+              <a:t>"D1"</a:t>
+            </a:r>
+            <a:r>
+              <a:rPr lang="en-US" dirty="0">
+                <a:solidFill>
+                  <a:srgbClr val="000000"/>
+                </a:solidFill>
+                <a:latin typeface="Consolas" panose="020B0609020204030204" pitchFamily="49" charset="0"/>
+              </a:rPr>
+              <a:t>,</a:t>
+            </a:r>
+          </a:p>
+          <a:p>
+            <a:r>
+              <a:rPr lang="en-US" dirty="0">
+                <a:solidFill>
+                  <a:srgbClr val="000000"/>
+                </a:solidFill>
+                <a:latin typeface="Consolas" panose="020B0609020204030204" pitchFamily="49" charset="0"/>
+              </a:rPr>
+              <a:t>                </a:t>
+            </a:r>
+            <a:r>
+              <a:rPr lang="en-US" dirty="0">
+                <a:solidFill>
+                  <a:srgbClr val="2E75B6"/>
+                </a:solidFill>
+                <a:latin typeface="Consolas" panose="020B0609020204030204" pitchFamily="49" charset="0"/>
+              </a:rPr>
+              <a:t>"tier"</a:t>
+            </a:r>
+            <a:r>
+              <a:rPr lang="en-US" dirty="0">
+                <a:solidFill>
+                  <a:srgbClr val="000000"/>
+                </a:solidFill>
+                <a:latin typeface="Consolas" panose="020B0609020204030204" pitchFamily="49" charset="0"/>
+              </a:rPr>
+              <a:t>: </a:t>
+            </a:r>
+            <a:r>
+              <a:rPr lang="en-US" dirty="0">
+                <a:solidFill>
+                  <a:srgbClr val="A31515"/>
+                </a:solidFill>
+                <a:latin typeface="Consolas" panose="020B0609020204030204" pitchFamily="49" charset="0"/>
+              </a:rPr>
+              <a:t>"Shared"</a:t>
+            </a:r>
+            <a:r>
+              <a:rPr lang="en-US" dirty="0">
+                <a:solidFill>
+                  <a:srgbClr val="000000"/>
+                </a:solidFill>
+                <a:latin typeface="Consolas" panose="020B0609020204030204" pitchFamily="49" charset="0"/>
+              </a:rPr>
+              <a:t>,</a:t>
+            </a:r>
+          </a:p>
+          <a:p>
+            <a:r>
+              <a:rPr lang="en-US" dirty="0">
+                <a:solidFill>
+                  <a:srgbClr val="000000"/>
+                </a:solidFill>
+                <a:latin typeface="Consolas" panose="020B0609020204030204" pitchFamily="49" charset="0"/>
+              </a:rPr>
+              <a:t>                </a:t>
+            </a:r>
+            <a:r>
+              <a:rPr lang="en-US" dirty="0">
+                <a:solidFill>
+                  <a:srgbClr val="2E75B6"/>
+                </a:solidFill>
+                <a:latin typeface="Consolas" panose="020B0609020204030204" pitchFamily="49" charset="0"/>
+              </a:rPr>
+              <a:t>"size"</a:t>
+            </a:r>
+            <a:r>
+              <a:rPr lang="en-US" dirty="0">
+                <a:solidFill>
+                  <a:srgbClr val="000000"/>
+                </a:solidFill>
+                <a:latin typeface="Consolas" panose="020B0609020204030204" pitchFamily="49" charset="0"/>
+              </a:rPr>
+              <a:t>: </a:t>
+            </a:r>
+            <a:r>
+              <a:rPr lang="en-US" dirty="0">
+                <a:solidFill>
+                  <a:srgbClr val="A31515"/>
+                </a:solidFill>
+                <a:latin typeface="Consolas" panose="020B0609020204030204" pitchFamily="49" charset="0"/>
+              </a:rPr>
+              <a:t>"D1"</a:t>
+            </a:r>
+            <a:r>
+              <a:rPr lang="en-US" dirty="0">
+                <a:solidFill>
+                  <a:srgbClr val="000000"/>
+                </a:solidFill>
+                <a:latin typeface="Consolas" panose="020B0609020204030204" pitchFamily="49" charset="0"/>
+              </a:rPr>
+              <a:t>,</a:t>
+            </a:r>
+          </a:p>
+          <a:p>
+            <a:r>
+              <a:rPr lang="en-US" dirty="0">
+                <a:solidFill>
+                  <a:srgbClr val="000000"/>
+                </a:solidFill>
+                <a:latin typeface="Consolas" panose="020B0609020204030204" pitchFamily="49" charset="0"/>
+              </a:rPr>
+              <a:t>                </a:t>
+            </a:r>
+            <a:r>
+              <a:rPr lang="en-US" dirty="0">
+                <a:solidFill>
+                  <a:srgbClr val="2E75B6"/>
+                </a:solidFill>
+                <a:latin typeface="Consolas" panose="020B0609020204030204" pitchFamily="49" charset="0"/>
+              </a:rPr>
+              <a:t>"family"</a:t>
+            </a:r>
+            <a:r>
+              <a:rPr lang="en-US" dirty="0">
+                <a:solidFill>
+                  <a:srgbClr val="000000"/>
+                </a:solidFill>
+                <a:latin typeface="Consolas" panose="020B0609020204030204" pitchFamily="49" charset="0"/>
+              </a:rPr>
+              <a:t>: </a:t>
+            </a:r>
+            <a:r>
+              <a:rPr lang="en-US" dirty="0">
+                <a:solidFill>
+                  <a:srgbClr val="A31515"/>
+                </a:solidFill>
+                <a:latin typeface="Consolas" panose="020B0609020204030204" pitchFamily="49" charset="0"/>
+              </a:rPr>
+              <a:t>"D"</a:t>
+            </a:r>
+            <a:r>
+              <a:rPr lang="en-US" dirty="0">
+                <a:solidFill>
+                  <a:srgbClr val="000000"/>
+                </a:solidFill>
+                <a:latin typeface="Consolas" panose="020B0609020204030204" pitchFamily="49" charset="0"/>
+              </a:rPr>
+              <a:t>,</a:t>
+            </a:r>
+          </a:p>
+          <a:p>
+            <a:r>
+              <a:rPr lang="en-US" dirty="0">
+                <a:solidFill>
+                  <a:srgbClr val="000000"/>
+                </a:solidFill>
+                <a:latin typeface="Consolas" panose="020B0609020204030204" pitchFamily="49" charset="0"/>
+              </a:rPr>
+              <a:t>                </a:t>
+            </a:r>
+            <a:r>
+              <a:rPr lang="en-US" dirty="0">
+                <a:solidFill>
+                  <a:srgbClr val="2E75B6"/>
+                </a:solidFill>
+                <a:latin typeface="Consolas" panose="020B0609020204030204" pitchFamily="49" charset="0"/>
+              </a:rPr>
+              <a:t>"capacity"</a:t>
+            </a:r>
+            <a:r>
+              <a:rPr lang="en-US" dirty="0">
+                <a:solidFill>
+                  <a:srgbClr val="000000"/>
+                </a:solidFill>
+                <a:latin typeface="Consolas" panose="020B0609020204030204" pitchFamily="49" charset="0"/>
+              </a:rPr>
+              <a:t>: 0</a:t>
+            </a:r>
+          </a:p>
+          <a:p>
+            <a:r>
+              <a:rPr lang="en-US" dirty="0">
+                <a:solidFill>
+                  <a:srgbClr val="000000"/>
+                </a:solidFill>
+                <a:latin typeface="Consolas" panose="020B0609020204030204" pitchFamily="49" charset="0"/>
+              </a:rPr>
+              <a:t>            },</a:t>
+            </a:r>
+          </a:p>
+          <a:p>
+            <a:r>
+              <a:rPr lang="en-US" dirty="0">
+                <a:solidFill>
+                  <a:srgbClr val="000000"/>
+                </a:solidFill>
+                <a:latin typeface="Consolas" panose="020B0609020204030204" pitchFamily="49" charset="0"/>
+              </a:rPr>
+              <a:t>            </a:t>
+            </a:r>
+            <a:r>
+              <a:rPr lang="en-US" dirty="0">
+                <a:solidFill>
+                  <a:srgbClr val="2E75B6"/>
+                </a:solidFill>
+                <a:latin typeface="Consolas" panose="020B0609020204030204" pitchFamily="49" charset="0"/>
+              </a:rPr>
+              <a:t>"kind"</a:t>
+            </a:r>
+            <a:r>
+              <a:rPr lang="en-US" dirty="0">
+                <a:solidFill>
+                  <a:srgbClr val="000000"/>
+                </a:solidFill>
+                <a:latin typeface="Consolas" panose="020B0609020204030204" pitchFamily="49" charset="0"/>
+              </a:rPr>
+              <a:t>: </a:t>
+            </a:r>
+            <a:r>
+              <a:rPr lang="en-US" dirty="0">
+                <a:solidFill>
+                  <a:srgbClr val="A31515"/>
+                </a:solidFill>
+                <a:latin typeface="Consolas" panose="020B0609020204030204" pitchFamily="49" charset="0"/>
+              </a:rPr>
+              <a:t>"app"</a:t>
+            </a:r>
+            <a:r>
+              <a:rPr lang="en-US" dirty="0">
+                <a:solidFill>
+                  <a:srgbClr val="000000"/>
+                </a:solidFill>
+                <a:latin typeface="Consolas" panose="020B0609020204030204" pitchFamily="49" charset="0"/>
+              </a:rPr>
+              <a:t>,</a:t>
+            </a:r>
+          </a:p>
+          <a:p>
+            <a:r>
+              <a:rPr lang="en-US" dirty="0">
+                <a:solidFill>
+                  <a:srgbClr val="000000"/>
+                </a:solidFill>
+                <a:latin typeface="Consolas" panose="020B0609020204030204" pitchFamily="49" charset="0"/>
+              </a:rPr>
+              <a:t>            </a:t>
+            </a:r>
+            <a:r>
+              <a:rPr lang="en-US" dirty="0">
+                <a:solidFill>
+                  <a:srgbClr val="2E75B6"/>
+                </a:solidFill>
+                <a:latin typeface="Consolas" panose="020B0609020204030204" pitchFamily="49" charset="0"/>
+              </a:rPr>
+              <a:t>"name"</a:t>
+            </a:r>
+            <a:r>
+              <a:rPr lang="en-US" dirty="0">
+                <a:solidFill>
+                  <a:srgbClr val="000000"/>
+                </a:solidFill>
+                <a:latin typeface="Consolas" panose="020B0609020204030204" pitchFamily="49" charset="0"/>
+              </a:rPr>
+              <a:t>: </a:t>
+            </a:r>
+            <a:r>
+              <a:rPr lang="en-US" dirty="0">
+                <a:solidFill>
+                  <a:srgbClr val="A31515"/>
+                </a:solidFill>
+                <a:latin typeface="Consolas" panose="020B0609020204030204" pitchFamily="49" charset="0"/>
+              </a:rPr>
+              <a:t>"[parameters('</a:t>
+            </a:r>
+            <a:r>
+              <a:rPr lang="en-US" dirty="0" err="1">
+                <a:solidFill>
+                  <a:srgbClr val="A31515"/>
+                </a:solidFill>
+                <a:latin typeface="Consolas" panose="020B0609020204030204" pitchFamily="49" charset="0"/>
+              </a:rPr>
+              <a:t>serverfarms_AzureUGBGWeb_name</a:t>
+            </a:r>
+            <a:r>
+              <a:rPr lang="en-US" dirty="0">
+                <a:solidFill>
+                  <a:srgbClr val="A31515"/>
+                </a:solidFill>
+                <a:latin typeface="Consolas" panose="020B0609020204030204" pitchFamily="49" charset="0"/>
+              </a:rPr>
+              <a:t>')]"</a:t>
+            </a:r>
+            <a:r>
+              <a:rPr lang="en-US" dirty="0">
+                <a:solidFill>
+                  <a:srgbClr val="000000"/>
+                </a:solidFill>
+                <a:latin typeface="Consolas" panose="020B0609020204030204" pitchFamily="49" charset="0"/>
+              </a:rPr>
+              <a:t>,</a:t>
+            </a:r>
+          </a:p>
+          <a:p>
+            <a:r>
+              <a:rPr lang="en-US" dirty="0">
+                <a:solidFill>
+                  <a:srgbClr val="000000"/>
+                </a:solidFill>
+                <a:latin typeface="Consolas" panose="020B0609020204030204" pitchFamily="49" charset="0"/>
+              </a:rPr>
+              <a:t>            </a:t>
+            </a:r>
+            <a:r>
+              <a:rPr lang="en-US" dirty="0">
+                <a:solidFill>
+                  <a:srgbClr val="2E75B6"/>
+                </a:solidFill>
+                <a:latin typeface="Consolas" panose="020B0609020204030204" pitchFamily="49" charset="0"/>
+              </a:rPr>
+              <a:t>"</a:t>
+            </a:r>
+            <a:r>
+              <a:rPr lang="en-US" dirty="0" err="1">
+                <a:solidFill>
+                  <a:srgbClr val="2E75B6"/>
+                </a:solidFill>
+                <a:latin typeface="Consolas" panose="020B0609020204030204" pitchFamily="49" charset="0"/>
+              </a:rPr>
+              <a:t>apiVersion</a:t>
+            </a:r>
+            <a:r>
+              <a:rPr lang="en-US" dirty="0">
+                <a:solidFill>
+                  <a:srgbClr val="2E75B6"/>
+                </a:solidFill>
+                <a:latin typeface="Consolas" panose="020B0609020204030204" pitchFamily="49" charset="0"/>
+              </a:rPr>
+              <a:t>"</a:t>
+            </a:r>
+            <a:r>
+              <a:rPr lang="en-US" dirty="0">
+                <a:solidFill>
+                  <a:srgbClr val="000000"/>
+                </a:solidFill>
+                <a:latin typeface="Consolas" panose="020B0609020204030204" pitchFamily="49" charset="0"/>
+              </a:rPr>
+              <a:t>: </a:t>
+            </a:r>
+            <a:r>
+              <a:rPr lang="en-US" dirty="0">
+                <a:solidFill>
+                  <a:srgbClr val="A31515"/>
+                </a:solidFill>
+                <a:latin typeface="Consolas" panose="020B0609020204030204" pitchFamily="49" charset="0"/>
+              </a:rPr>
+              <a:t>"2016-09-01"</a:t>
+            </a:r>
+            <a:r>
+              <a:rPr lang="en-US" dirty="0">
+                <a:solidFill>
+                  <a:srgbClr val="000000"/>
+                </a:solidFill>
+                <a:latin typeface="Consolas" panose="020B0609020204030204" pitchFamily="49" charset="0"/>
+              </a:rPr>
+              <a:t>,</a:t>
+            </a:r>
+          </a:p>
+          <a:p>
+            <a:r>
+              <a:rPr lang="en-US" dirty="0">
+                <a:solidFill>
+                  <a:srgbClr val="000000"/>
+                </a:solidFill>
+                <a:latin typeface="Consolas" panose="020B0609020204030204" pitchFamily="49" charset="0"/>
+              </a:rPr>
+              <a:t>            </a:t>
+            </a:r>
+            <a:r>
+              <a:rPr lang="en-US" sz="2400" b="1" dirty="0">
+                <a:solidFill>
+                  <a:srgbClr val="2E75B6"/>
+                </a:solidFill>
+                <a:latin typeface="Consolas" panose="020B0609020204030204" pitchFamily="49" charset="0"/>
+              </a:rPr>
+              <a:t>"location"</a:t>
+            </a:r>
+            <a:r>
+              <a:rPr lang="en-US" sz="2400" b="1" dirty="0">
+                <a:solidFill>
+                  <a:srgbClr val="000000"/>
+                </a:solidFill>
+                <a:latin typeface="Consolas" panose="020B0609020204030204" pitchFamily="49" charset="0"/>
+              </a:rPr>
+              <a:t>: </a:t>
+            </a:r>
+            <a:r>
+              <a:rPr lang="en-US" sz="2400" dirty="0">
+                <a:solidFill>
+                  <a:srgbClr val="A31515"/>
+                </a:solidFill>
+                <a:latin typeface="Consolas" panose="020B0609020204030204" pitchFamily="49" charset="0"/>
+              </a:rPr>
+              <a:t>"West Europe"</a:t>
+            </a:r>
+            <a:r>
+              <a:rPr lang="en-US" sz="2400" dirty="0">
+                <a:solidFill>
+                  <a:srgbClr val="000000"/>
+                </a:solidFill>
+                <a:latin typeface="Consolas" panose="020B0609020204030204" pitchFamily="49" charset="0"/>
+              </a:rPr>
+              <a:t>,</a:t>
+            </a:r>
+          </a:p>
+          <a:p>
+            <a:r>
+              <a:rPr lang="en-US" dirty="0">
+                <a:solidFill>
+                  <a:srgbClr val="000000"/>
+                </a:solidFill>
+                <a:latin typeface="Consolas" panose="020B0609020204030204" pitchFamily="49" charset="0"/>
+              </a:rPr>
+              <a:t>            </a:t>
+            </a:r>
+            <a:r>
+              <a:rPr lang="en-US" dirty="0">
+                <a:solidFill>
+                  <a:srgbClr val="2E75B6"/>
+                </a:solidFill>
+                <a:latin typeface="Consolas" panose="020B0609020204030204" pitchFamily="49" charset="0"/>
+              </a:rPr>
+              <a:t>"scale"</a:t>
+            </a:r>
+            <a:r>
+              <a:rPr lang="en-US" dirty="0">
+                <a:solidFill>
+                  <a:srgbClr val="000000"/>
+                </a:solidFill>
+                <a:latin typeface="Consolas" panose="020B0609020204030204" pitchFamily="49" charset="0"/>
+              </a:rPr>
+              <a:t>: </a:t>
+            </a:r>
+            <a:r>
+              <a:rPr lang="en-US" dirty="0">
+                <a:solidFill>
+                  <a:srgbClr val="0000FF"/>
+                </a:solidFill>
+                <a:latin typeface="Consolas" panose="020B0609020204030204" pitchFamily="49" charset="0"/>
+              </a:rPr>
+              <a:t>null</a:t>
+            </a:r>
+            <a:r>
+              <a:rPr lang="en-US" dirty="0">
+                <a:solidFill>
+                  <a:srgbClr val="000000"/>
+                </a:solidFill>
+                <a:latin typeface="Consolas" panose="020B0609020204030204" pitchFamily="49" charset="0"/>
+              </a:rPr>
+              <a:t>,</a:t>
+            </a:r>
+          </a:p>
+          <a:p>
+            <a:r>
+              <a:rPr lang="en-US" dirty="0">
+                <a:solidFill>
+                  <a:srgbClr val="000000"/>
+                </a:solidFill>
+                <a:latin typeface="Consolas" panose="020B0609020204030204" pitchFamily="49" charset="0"/>
+              </a:rPr>
+              <a:t>            </a:t>
+            </a:r>
+            <a:r>
+              <a:rPr lang="en-US" dirty="0">
+                <a:solidFill>
+                  <a:srgbClr val="2E75B6"/>
+                </a:solidFill>
+                <a:latin typeface="Consolas" panose="020B0609020204030204" pitchFamily="49" charset="0"/>
+              </a:rPr>
+              <a:t>"</a:t>
+            </a:r>
+            <a:r>
+              <a:rPr lang="en-US" dirty="0" err="1">
+                <a:solidFill>
+                  <a:srgbClr val="2E75B6"/>
+                </a:solidFill>
+                <a:latin typeface="Consolas" panose="020B0609020204030204" pitchFamily="49" charset="0"/>
+              </a:rPr>
+              <a:t>dependsOn</a:t>
+            </a:r>
+            <a:r>
+              <a:rPr lang="en-US" dirty="0">
+                <a:solidFill>
+                  <a:srgbClr val="2E75B6"/>
+                </a:solidFill>
+                <a:latin typeface="Consolas" panose="020B0609020204030204" pitchFamily="49" charset="0"/>
+              </a:rPr>
+              <a:t>"</a:t>
+            </a:r>
+            <a:r>
+              <a:rPr lang="en-US" dirty="0">
+                <a:solidFill>
+                  <a:srgbClr val="000000"/>
+                </a:solidFill>
+                <a:latin typeface="Consolas" panose="020B0609020204030204" pitchFamily="49" charset="0"/>
+              </a:rPr>
+              <a:t>: []</a:t>
+            </a:r>
+          </a:p>
+          <a:p>
+            <a:r>
+              <a:rPr lang="en-US" dirty="0">
+                <a:solidFill>
+                  <a:srgbClr val="000000"/>
+                </a:solidFill>
+                <a:latin typeface="Consolas" panose="020B0609020204030204" pitchFamily="49" charset="0"/>
+              </a:rPr>
+              <a:t>        }</a:t>
+            </a:r>
+          </a:p>
+          <a:p>
+            <a:r>
+              <a:rPr lang="en-US" dirty="0">
+                <a:solidFill>
+                  <a:srgbClr val="000000"/>
+                </a:solidFill>
+                <a:latin typeface="Consolas" panose="020B0609020204030204" pitchFamily="49" charset="0"/>
+              </a:rPr>
+              <a:t>    ]</a:t>
+            </a:r>
+          </a:p>
+          <a:p>
+            <a:r>
+              <a:rPr lang="en-US" dirty="0">
+                <a:solidFill>
+                  <a:srgbClr val="000000"/>
+                </a:solidFill>
+                <a:latin typeface="Consolas" panose="020B0609020204030204" pitchFamily="49" charset="0"/>
+              </a:rPr>
+              <a:t>}</a:t>
             </a:r>
             <a:endParaRPr lang="en-US" dirty="0"/>
           </a:p>
@@ -12452,36 +12340,269 @@
       </p:sp>
       <p:sp>
         <p:nvSpPr>
-          <p:cNvPr id="3" name="Title 2">
+          <p:cNvPr id="5" name="TextBox 4">
             <a:extLst>
               <a:ext uri="{FF2B5EF4-FFF2-40B4-BE49-F238E27FC236}">
-                <a16:creationId xmlns:a16="http://schemas.microsoft.com/office/drawing/2014/main" id="{B63BF04D-3A3F-4416-BDA6-6CA65511D55A}"/>
+                <a16:creationId xmlns:a16="http://schemas.microsoft.com/office/drawing/2014/main" id="{6F79AA87-09D7-44E0-8698-92EDC35F582C}"/>
               </a:ext>
             </a:extLst>
           </p:cNvPr>
-          <p:cNvSpPr>
-            <a:spLocks noGrp="1"/>
-          </p:cNvSpPr>
-          <p:nvPr>
-            <p:ph type="title"/>
-          </p:nvPr>
+          <p:cNvSpPr txBox="1"/>
+          <p:nvPr/>
         </p:nvSpPr>
-        <p:spPr/>
+        <p:spPr>
+          <a:xfrm>
+            <a:off x="4905983" y="2208179"/>
+            <a:ext cx="7286017" cy="1403461"/>
+          </a:xfrm>
+          <a:prstGeom prst="rect">
+            <a:avLst/>
+          </a:prstGeom>
+          <a:solidFill>
+            <a:schemeClr val="tx1">
+              <a:lumMod val="20000"/>
+              <a:lumOff val="80000"/>
+            </a:schemeClr>
+          </a:solidFill>
+          <a:ln>
+            <a:solidFill>
+              <a:schemeClr val="tx2"/>
+            </a:solidFill>
+          </a:ln>
+        </p:spPr>
         <p:txBody>
-          <a:bodyPr/>
+          <a:bodyPr wrap="square" lIns="182880" tIns="146304" rIns="182880" bIns="146304" rtlCol="0">
+            <a:spAutoFit/>
+          </a:bodyPr>
           <a:lstStyle/>
           <a:p>
             <a:r>
-              <a:rPr lang="en-US" dirty="0"/>
-              <a:t>Criteria</a:t>
+              <a:rPr lang="en-US" dirty="0">
+                <a:solidFill>
+                  <a:srgbClr val="000000"/>
+                </a:solidFill>
+                <a:latin typeface="Consolas" panose="020B0609020204030204" pitchFamily="49" charset="0"/>
+              </a:rPr>
+              <a:t>{</a:t>
+            </a:r>
+          </a:p>
+          <a:p>
+            <a:r>
+              <a:rPr lang="en-US" dirty="0">
+                <a:solidFill>
+                  <a:srgbClr val="000000"/>
+                </a:solidFill>
+                <a:latin typeface="Consolas" panose="020B0609020204030204" pitchFamily="49" charset="0"/>
+              </a:rPr>
+              <a:t>    </a:t>
+            </a:r>
+            <a:r>
+              <a:rPr lang="en-US" dirty="0">
+                <a:solidFill>
+                  <a:srgbClr val="2E75B6"/>
+                </a:solidFill>
+                <a:latin typeface="Consolas" panose="020B0609020204030204" pitchFamily="49" charset="0"/>
+              </a:rPr>
+              <a:t>"field"</a:t>
+            </a:r>
+            <a:r>
+              <a:rPr lang="en-US" dirty="0">
+                <a:solidFill>
+                  <a:srgbClr val="000000"/>
+                </a:solidFill>
+                <a:latin typeface="Consolas" panose="020B0609020204030204" pitchFamily="49" charset="0"/>
+              </a:rPr>
+              <a:t>: </a:t>
+            </a:r>
+            <a:r>
+              <a:rPr lang="en-US" dirty="0">
+                <a:solidFill>
+                  <a:srgbClr val="A31515"/>
+                </a:solidFill>
+                <a:latin typeface="Consolas" panose="020B0609020204030204" pitchFamily="49" charset="0"/>
+              </a:rPr>
+              <a:t>"location"</a:t>
+            </a:r>
+            <a:r>
+              <a:rPr lang="en-US" dirty="0">
+                <a:solidFill>
+                  <a:srgbClr val="000000"/>
+                </a:solidFill>
+                <a:latin typeface="Consolas" panose="020B0609020204030204" pitchFamily="49" charset="0"/>
+              </a:rPr>
+              <a:t>,</a:t>
+            </a:r>
+          </a:p>
+          <a:p>
+            <a:r>
+              <a:rPr lang="en-US" dirty="0">
+                <a:solidFill>
+                  <a:srgbClr val="000000"/>
+                </a:solidFill>
+                <a:latin typeface="Consolas" panose="020B0609020204030204" pitchFamily="49" charset="0"/>
+              </a:rPr>
+              <a:t>    </a:t>
+            </a:r>
+            <a:r>
+              <a:rPr lang="en-US" dirty="0">
+                <a:solidFill>
+                  <a:srgbClr val="2E75B6"/>
+                </a:solidFill>
+                <a:latin typeface="Consolas" panose="020B0609020204030204" pitchFamily="49" charset="0"/>
+              </a:rPr>
+              <a:t>"in"</a:t>
+            </a:r>
+            <a:r>
+              <a:rPr lang="en-US" dirty="0">
+                <a:solidFill>
+                  <a:srgbClr val="000000"/>
+                </a:solidFill>
+                <a:latin typeface="Consolas" panose="020B0609020204030204" pitchFamily="49" charset="0"/>
+              </a:rPr>
+              <a:t>: [</a:t>
+            </a:r>
+            <a:r>
+              <a:rPr lang="en-US" dirty="0">
+                <a:solidFill>
+                  <a:srgbClr val="A31515"/>
+                </a:solidFill>
+                <a:latin typeface="Consolas" panose="020B0609020204030204" pitchFamily="49" charset="0"/>
+              </a:rPr>
+              <a:t>"Australia East"</a:t>
+            </a:r>
+            <a:r>
+              <a:rPr lang="en-US" dirty="0">
+                <a:solidFill>
+                  <a:srgbClr val="000000"/>
+                </a:solidFill>
+                <a:latin typeface="Consolas" panose="020B0609020204030204" pitchFamily="49" charset="0"/>
+              </a:rPr>
+              <a:t>, </a:t>
+            </a:r>
+            <a:r>
+              <a:rPr lang="en-US" dirty="0">
+                <a:solidFill>
+                  <a:srgbClr val="A31515"/>
+                </a:solidFill>
+                <a:latin typeface="Consolas" panose="020B0609020204030204" pitchFamily="49" charset="0"/>
+              </a:rPr>
+              <a:t>"Australia Southeast"</a:t>
+            </a:r>
+            <a:r>
+              <a:rPr lang="en-US" dirty="0">
+                <a:solidFill>
+                  <a:srgbClr val="000000"/>
+                </a:solidFill>
+                <a:latin typeface="Consolas" panose="020B0609020204030204" pitchFamily="49" charset="0"/>
+              </a:rPr>
+              <a:t>]</a:t>
+            </a:r>
+          </a:p>
+          <a:p>
+            <a:r>
+              <a:rPr lang="en-US" dirty="0">
+                <a:solidFill>
+                  <a:srgbClr val="000000"/>
+                </a:solidFill>
+                <a:latin typeface="Consolas" panose="020B0609020204030204" pitchFamily="49" charset="0"/>
+              </a:rPr>
+              <a:t>}</a:t>
             </a:r>
           </a:p>
         </p:txBody>
       </p:sp>
+      <p:cxnSp>
+        <p:nvCxnSpPr>
+          <p:cNvPr id="7" name="Straight Arrow Connector 6">
+            <a:extLst>
+              <a:ext uri="{FF2B5EF4-FFF2-40B4-BE49-F238E27FC236}">
+                <a16:creationId xmlns:a16="http://schemas.microsoft.com/office/drawing/2014/main" id="{D304B3BD-8A4D-4A4F-B76B-E242EC9D0F70}"/>
+              </a:ext>
+            </a:extLst>
+          </p:cNvPr>
+          <p:cNvCxnSpPr/>
+          <p:nvPr/>
+        </p:nvCxnSpPr>
+        <p:spPr>
+          <a:xfrm flipH="1">
+            <a:off x="3093396" y="2801566"/>
+            <a:ext cx="2402732" cy="1896894"/>
+          </a:xfrm>
+          <a:prstGeom prst="straightConnector1">
+            <a:avLst/>
+          </a:prstGeom>
+          <a:ln w="41275">
+            <a:solidFill>
+              <a:schemeClr val="tx1"/>
+            </a:solidFill>
+            <a:headEnd type="none"/>
+            <a:tailEnd type="triangle"/>
+          </a:ln>
+        </p:spPr>
+        <p:style>
+          <a:lnRef idx="1">
+            <a:schemeClr val="accent1"/>
+          </a:lnRef>
+          <a:fillRef idx="0">
+            <a:schemeClr val="accent1"/>
+          </a:fillRef>
+          <a:effectRef idx="0">
+            <a:schemeClr val="accent1"/>
+          </a:effectRef>
+          <a:fontRef idx="minor">
+            <a:schemeClr val="tx1"/>
+          </a:fontRef>
+        </p:style>
+      </p:cxnSp>
+      <p:cxnSp>
+        <p:nvCxnSpPr>
+          <p:cNvPr id="8" name="Straight Arrow Connector 7">
+            <a:extLst>
+              <a:ext uri="{FF2B5EF4-FFF2-40B4-BE49-F238E27FC236}">
+                <a16:creationId xmlns:a16="http://schemas.microsoft.com/office/drawing/2014/main" id="{1AF15554-85CF-46BB-A277-DF037959DE62}"/>
+              </a:ext>
+            </a:extLst>
+          </p:cNvPr>
+          <p:cNvCxnSpPr>
+            <a:cxnSpLocks/>
+          </p:cNvCxnSpPr>
+          <p:nvPr/>
+        </p:nvCxnSpPr>
+        <p:spPr>
+          <a:xfrm flipH="1">
+            <a:off x="6031149" y="3274979"/>
+            <a:ext cx="3420893" cy="1540212"/>
+          </a:xfrm>
+          <a:prstGeom prst="straightConnector1">
+            <a:avLst/>
+          </a:prstGeom>
+          <a:ln w="41275">
+            <a:solidFill>
+              <a:schemeClr val="tx1"/>
+            </a:solidFill>
+            <a:headEnd type="none"/>
+            <a:tailEnd type="triangle"/>
+          </a:ln>
+        </p:spPr>
+        <p:style>
+          <a:lnRef idx="1">
+            <a:schemeClr val="accent1"/>
+          </a:lnRef>
+          <a:fillRef idx="0">
+            <a:schemeClr val="accent1"/>
+          </a:fillRef>
+          <a:effectRef idx="0">
+            <a:schemeClr val="accent1"/>
+          </a:effectRef>
+          <a:fontRef idx="minor">
+            <a:schemeClr val="tx1"/>
+          </a:fontRef>
+        </p:style>
+      </p:cxnSp>
     </p:spTree>
     <p:extLst>
       <p:ext uri="{BB962C8B-B14F-4D97-AF65-F5344CB8AC3E}">
-        <p14:creationId xmlns:p14="http://schemas.microsoft.com/office/powerpoint/2010/main" val="829054741"/>
+        <p14:creationId xmlns:p14="http://schemas.microsoft.com/office/powerpoint/2010/main" val="1567756374"/>
       </p:ext>
     </p:extLst>
   </p:cSld>
@@ -12491,6 +12612,174 @@
   <p:transition>
     <p:fade/>
   </p:transition>
+  <p:timing>
+    <p:tnLst>
+      <p:par>
+        <p:cTn id="1" dur="indefinite" restart="never" nodeType="tmRoot">
+          <p:childTnLst>
+            <p:seq concurrent="1" nextAc="seek">
+              <p:cTn id="2" dur="indefinite" nodeType="mainSeq">
+                <p:childTnLst>
+                  <p:par>
+                    <p:cTn id="3" fill="hold">
+                      <p:stCondLst>
+                        <p:cond delay="indefinite"/>
+                      </p:stCondLst>
+                      <p:childTnLst>
+                        <p:par>
+                          <p:cTn id="4" fill="hold">
+                            <p:stCondLst>
+                              <p:cond delay="0"/>
+                            </p:stCondLst>
+                            <p:childTnLst>
+                              <p:par>
+                                <p:cTn id="5" presetID="1" presetClass="entr" presetSubtype="0" fill="hold" grpId="0" nodeType="clickEffect">
+                                  <p:stCondLst>
+                                    <p:cond delay="0"/>
+                                  </p:stCondLst>
+                                  <p:childTnLst>
+                                    <p:set>
+                                      <p:cBhvr>
+                                        <p:cTn id="6" dur="1" fill="hold">
+                                          <p:stCondLst>
+                                            <p:cond delay="0"/>
+                                          </p:stCondLst>
+                                        </p:cTn>
+                                        <p:tgtEl>
+                                          <p:spTgt spid="5"/>
+                                        </p:tgtEl>
+                                        <p:attrNameLst>
+                                          <p:attrName>style.visibility</p:attrName>
+                                        </p:attrNameLst>
+                                      </p:cBhvr>
+                                      <p:to>
+                                        <p:strVal val="visible"/>
+                                      </p:to>
+                                    </p:set>
+                                  </p:childTnLst>
+                                </p:cTn>
+                              </p:par>
+                            </p:childTnLst>
+                          </p:cTn>
+                        </p:par>
+                      </p:childTnLst>
+                    </p:cTn>
+                  </p:par>
+                  <p:par>
+                    <p:cTn id="7" fill="hold">
+                      <p:stCondLst>
+                        <p:cond delay="indefinite"/>
+                      </p:stCondLst>
+                      <p:childTnLst>
+                        <p:par>
+                          <p:cTn id="8" fill="hold">
+                            <p:stCondLst>
+                              <p:cond delay="0"/>
+                            </p:stCondLst>
+                            <p:childTnLst>
+                              <p:par>
+                                <p:cTn id="9" presetID="1" presetClass="entr" presetSubtype="0" fill="hold" nodeType="clickEffect">
+                                  <p:stCondLst>
+                                    <p:cond delay="0"/>
+                                  </p:stCondLst>
+                                  <p:childTnLst>
+                                    <p:set>
+                                      <p:cBhvr>
+                                        <p:cTn id="10" dur="1" fill="hold">
+                                          <p:stCondLst>
+                                            <p:cond delay="0"/>
+                                          </p:stCondLst>
+                                        </p:cTn>
+                                        <p:tgtEl>
+                                          <p:spTgt spid="7"/>
+                                        </p:tgtEl>
+                                        <p:attrNameLst>
+                                          <p:attrName>style.visibility</p:attrName>
+                                        </p:attrNameLst>
+                                      </p:cBhvr>
+                                      <p:to>
+                                        <p:strVal val="visible"/>
+                                      </p:to>
+                                    </p:set>
+                                  </p:childTnLst>
+                                </p:cTn>
+                              </p:par>
+                            </p:childTnLst>
+                          </p:cTn>
+                        </p:par>
+                      </p:childTnLst>
+                    </p:cTn>
+                  </p:par>
+                  <p:par>
+                    <p:cTn id="11" fill="hold">
+                      <p:stCondLst>
+                        <p:cond delay="indefinite"/>
+                      </p:stCondLst>
+                      <p:childTnLst>
+                        <p:par>
+                          <p:cTn id="12" fill="hold">
+                            <p:stCondLst>
+                              <p:cond delay="0"/>
+                            </p:stCondLst>
+                            <p:childTnLst>
+                              <p:par>
+                                <p:cTn id="13" presetID="1" presetClass="entr" presetSubtype="0" fill="hold" nodeType="clickEffect">
+                                  <p:stCondLst>
+                                    <p:cond delay="0"/>
+                                  </p:stCondLst>
+                                  <p:childTnLst>
+                                    <p:set>
+                                      <p:cBhvr>
+                                        <p:cTn id="14" dur="1" fill="hold">
+                                          <p:stCondLst>
+                                            <p:cond delay="0"/>
+                                          </p:stCondLst>
+                                        </p:cTn>
+                                        <p:tgtEl>
+                                          <p:spTgt spid="8"/>
+                                        </p:tgtEl>
+                                        <p:attrNameLst>
+                                          <p:attrName>style.visibility</p:attrName>
+                                        </p:attrNameLst>
+                                      </p:cBhvr>
+                                      <p:to>
+                                        <p:strVal val="visible"/>
+                                      </p:to>
+                                    </p:set>
+                                  </p:childTnLst>
+                                </p:cTn>
+                              </p:par>
+                            </p:childTnLst>
+                          </p:cTn>
+                        </p:par>
+                      </p:childTnLst>
+                    </p:cTn>
+                  </p:par>
+                </p:childTnLst>
+              </p:cTn>
+              <p:prevCondLst>
+                <p:cond evt="onPrev" delay="0">
+                  <p:tgtEl>
+                    <p:sldTgt/>
+                  </p:tgtEl>
+                </p:cond>
+              </p:prevCondLst>
+              <p:nextCondLst>
+                <p:cond evt="onNext" delay="0">
+                  <p:tgtEl>
+                    <p:sldTgt/>
+                  </p:tgtEl>
+                </p:cond>
+              </p:nextCondLst>
+            </p:seq>
+          </p:childTnLst>
+        </p:cTn>
+      </p:par>
+    </p:tnLst>
+    <p:bldLst>
+      <p:bldP spid="5" grpId="0" animBg="1"/>
+    </p:bldLst>
+  </p:timing>
 </p:sld>
 </file>
 

</xml_diff>